<commit_message>
added thompson's method on teh poster
</commit_message>
<xml_diff>
--- a/poster/research-poster-template-2.pptx
+++ b/poster/research-poster-template-2.pptx
@@ -13,14 +13,14 @@
   <p:sldIdLst>
     <p:sldId id="256" r:id="rId2"/>
   </p:sldIdLst>
-  <p:sldSz cx="43891200" cy="32918400"/>
+  <p:sldSz cx="32918400" cy="21945600"/>
   <p:notesSz cx="6858000" cy="9144000"/>
   <p:defaultTextStyle>
     <a:defPPr>
       <a:defRPr lang="en-US"/>
     </a:defPPr>
-    <a:lvl1pPr marL="0" algn="l" defTabSz="3686861" rtl="0" eaLnBrk="1" latinLnBrk="0" hangingPunct="1">
-      <a:defRPr sz="7258" kern="1200">
+    <a:lvl1pPr marL="0" algn="l" defTabSz="2633156" rtl="0" eaLnBrk="1" latinLnBrk="0" hangingPunct="1">
+      <a:defRPr sz="5184" kern="1200">
         <a:solidFill>
           <a:schemeClr val="tx1"/>
         </a:solidFill>
@@ -29,8 +29,8 @@
         <a:cs typeface="+mn-cs"/>
       </a:defRPr>
     </a:lvl1pPr>
-    <a:lvl2pPr marL="1843430" algn="l" defTabSz="3686861" rtl="0" eaLnBrk="1" latinLnBrk="0" hangingPunct="1">
-      <a:defRPr sz="7258" kern="1200">
+    <a:lvl2pPr marL="1316578" algn="l" defTabSz="2633156" rtl="0" eaLnBrk="1" latinLnBrk="0" hangingPunct="1">
+      <a:defRPr sz="5184" kern="1200">
         <a:solidFill>
           <a:schemeClr val="tx1"/>
         </a:solidFill>
@@ -39,8 +39,8 @@
         <a:cs typeface="+mn-cs"/>
       </a:defRPr>
     </a:lvl2pPr>
-    <a:lvl3pPr marL="3686861" algn="l" defTabSz="3686861" rtl="0" eaLnBrk="1" latinLnBrk="0" hangingPunct="1">
-      <a:defRPr sz="7258" kern="1200">
+    <a:lvl3pPr marL="2633156" algn="l" defTabSz="2633156" rtl="0" eaLnBrk="1" latinLnBrk="0" hangingPunct="1">
+      <a:defRPr sz="5184" kern="1200">
         <a:solidFill>
           <a:schemeClr val="tx1"/>
         </a:solidFill>
@@ -49,8 +49,8 @@
         <a:cs typeface="+mn-cs"/>
       </a:defRPr>
     </a:lvl3pPr>
-    <a:lvl4pPr marL="5530291" algn="l" defTabSz="3686861" rtl="0" eaLnBrk="1" latinLnBrk="0" hangingPunct="1">
-      <a:defRPr sz="7258" kern="1200">
+    <a:lvl4pPr marL="3949734" algn="l" defTabSz="2633156" rtl="0" eaLnBrk="1" latinLnBrk="0" hangingPunct="1">
+      <a:defRPr sz="5184" kern="1200">
         <a:solidFill>
           <a:schemeClr val="tx1"/>
         </a:solidFill>
@@ -59,8 +59,8 @@
         <a:cs typeface="+mn-cs"/>
       </a:defRPr>
     </a:lvl4pPr>
-    <a:lvl5pPr marL="7373722" algn="l" defTabSz="3686861" rtl="0" eaLnBrk="1" latinLnBrk="0" hangingPunct="1">
-      <a:defRPr sz="7258" kern="1200">
+    <a:lvl5pPr marL="5266312" algn="l" defTabSz="2633156" rtl="0" eaLnBrk="1" latinLnBrk="0" hangingPunct="1">
+      <a:defRPr sz="5184" kern="1200">
         <a:solidFill>
           <a:schemeClr val="tx1"/>
         </a:solidFill>
@@ -69,8 +69,8 @@
         <a:cs typeface="+mn-cs"/>
       </a:defRPr>
     </a:lvl5pPr>
-    <a:lvl6pPr marL="9217152" algn="l" defTabSz="3686861" rtl="0" eaLnBrk="1" latinLnBrk="0" hangingPunct="1">
-      <a:defRPr sz="7258" kern="1200">
+    <a:lvl6pPr marL="6582890" algn="l" defTabSz="2633156" rtl="0" eaLnBrk="1" latinLnBrk="0" hangingPunct="1">
+      <a:defRPr sz="5184" kern="1200">
         <a:solidFill>
           <a:schemeClr val="tx1"/>
         </a:solidFill>
@@ -79,8 +79,8 @@
         <a:cs typeface="+mn-cs"/>
       </a:defRPr>
     </a:lvl6pPr>
-    <a:lvl7pPr marL="11060582" algn="l" defTabSz="3686861" rtl="0" eaLnBrk="1" latinLnBrk="0" hangingPunct="1">
-      <a:defRPr sz="7258" kern="1200">
+    <a:lvl7pPr marL="7899468" algn="l" defTabSz="2633156" rtl="0" eaLnBrk="1" latinLnBrk="0" hangingPunct="1">
+      <a:defRPr sz="5184" kern="1200">
         <a:solidFill>
           <a:schemeClr val="tx1"/>
         </a:solidFill>
@@ -89,8 +89,8 @@
         <a:cs typeface="+mn-cs"/>
       </a:defRPr>
     </a:lvl7pPr>
-    <a:lvl8pPr marL="12904013" algn="l" defTabSz="3686861" rtl="0" eaLnBrk="1" latinLnBrk="0" hangingPunct="1">
-      <a:defRPr sz="7258" kern="1200">
+    <a:lvl8pPr marL="9216046" algn="l" defTabSz="2633156" rtl="0" eaLnBrk="1" latinLnBrk="0" hangingPunct="1">
+      <a:defRPr sz="5184" kern="1200">
         <a:solidFill>
           <a:schemeClr val="tx1"/>
         </a:solidFill>
@@ -99,8 +99,8 @@
         <a:cs typeface="+mn-cs"/>
       </a:defRPr>
     </a:lvl8pPr>
-    <a:lvl9pPr marL="14747443" algn="l" defTabSz="3686861" rtl="0" eaLnBrk="1" latinLnBrk="0" hangingPunct="1">
-      <a:defRPr sz="7258" kern="1200">
+    <a:lvl9pPr marL="10532624" algn="l" defTabSz="2633156" rtl="0" eaLnBrk="1" latinLnBrk="0" hangingPunct="1">
+      <a:defRPr sz="5184" kern="1200">
         <a:solidFill>
           <a:schemeClr val="tx1"/>
         </a:solidFill>
@@ -113,12 +113,12 @@
   <p:extLst>
     <p:ext uri="{EFAFB233-063F-42B5-8137-9DF3F51BA10A}">
       <p15:sldGuideLst xmlns:p15="http://schemas.microsoft.com/office/powerpoint/2012/main">
-        <p15:guide id="1" orient="horz" pos="10368">
+        <p15:guide id="1" orient="horz" pos="6912" userDrawn="1">
           <p15:clr>
             <a:srgbClr val="A4A3A4"/>
           </p15:clr>
         </p15:guide>
-        <p15:guide id="2" pos="13824">
+        <p15:guide id="2" pos="10368" userDrawn="1">
           <p15:clr>
             <a:srgbClr val="A4A3A4"/>
           </p15:clr>
@@ -2670,7 +2670,7 @@
           <a:p>
             <a:fld id="{F1C0B079-A316-4C9B-B165-DF9EA8325D2C}" type="datetimeFigureOut">
               <a:rPr lang="en-US" smtClean="0"/>
-              <a:t>4/14/2019</a:t>
+              <a:t>4/15/2019</a:t>
             </a:fld>
             <a:endParaRPr lang="en-US"/>
           </a:p>
@@ -2835,7 +2835,7 @@
           <a:p>
             <a:fld id="{38F28AB8-57D1-494F-9851-055AD867E790}" type="datetimeFigureOut">
               <a:rPr lang="en-US" smtClean="0"/>
-              <a:t>4/14/2019</a:t>
+              <a:t>4/15/2019</a:t>
             </a:fld>
             <a:endParaRPr lang="en-US"/>
           </a:p>
@@ -2853,8 +2853,8 @@
         </p:nvSpPr>
         <p:spPr>
           <a:xfrm>
-            <a:off x="1371600" y="1143000"/>
-            <a:ext cx="4114800" cy="3086100"/>
+            <a:off x="1114425" y="1143000"/>
+            <a:ext cx="4629150" cy="3086100"/>
           </a:xfrm>
           <a:prstGeom prst="rect">
             <a:avLst/>
@@ -3008,8 +3008,8 @@
   </p:cSld>
   <p:clrMap bg1="lt1" tx1="dk1" bg2="lt2" tx2="dk2" accent1="accent1" accent2="accent2" accent3="accent3" accent4="accent4" accent5="accent5" accent6="accent6" hlink="hlink" folHlink="folHlink"/>
   <p:notesStyle>
-    <a:lvl1pPr marL="0" algn="l" defTabSz="914400" rtl="0" eaLnBrk="1" latinLnBrk="0" hangingPunct="1">
-      <a:defRPr sz="1200" kern="1200">
+    <a:lvl1pPr marL="0" algn="l" defTabSz="653064" rtl="0" eaLnBrk="1" latinLnBrk="0" hangingPunct="1">
+      <a:defRPr sz="857" kern="1200">
         <a:solidFill>
           <a:schemeClr val="tx1"/>
         </a:solidFill>
@@ -3018,8 +3018,8 @@
         <a:cs typeface="+mn-cs"/>
       </a:defRPr>
     </a:lvl1pPr>
-    <a:lvl2pPr marL="457200" algn="l" defTabSz="914400" rtl="0" eaLnBrk="1" latinLnBrk="0" hangingPunct="1">
-      <a:defRPr sz="1200" kern="1200">
+    <a:lvl2pPr marL="326532" algn="l" defTabSz="653064" rtl="0" eaLnBrk="1" latinLnBrk="0" hangingPunct="1">
+      <a:defRPr sz="857" kern="1200">
         <a:solidFill>
           <a:schemeClr val="tx1"/>
         </a:solidFill>
@@ -3028,8 +3028,8 @@
         <a:cs typeface="+mn-cs"/>
       </a:defRPr>
     </a:lvl2pPr>
-    <a:lvl3pPr marL="914400" algn="l" defTabSz="914400" rtl="0" eaLnBrk="1" latinLnBrk="0" hangingPunct="1">
-      <a:defRPr sz="1200" kern="1200">
+    <a:lvl3pPr marL="653064" algn="l" defTabSz="653064" rtl="0" eaLnBrk="1" latinLnBrk="0" hangingPunct="1">
+      <a:defRPr sz="857" kern="1200">
         <a:solidFill>
           <a:schemeClr val="tx1"/>
         </a:solidFill>
@@ -3038,8 +3038,8 @@
         <a:cs typeface="+mn-cs"/>
       </a:defRPr>
     </a:lvl3pPr>
-    <a:lvl4pPr marL="1371600" algn="l" defTabSz="914400" rtl="0" eaLnBrk="1" latinLnBrk="0" hangingPunct="1">
-      <a:defRPr sz="1200" kern="1200">
+    <a:lvl4pPr marL="979597" algn="l" defTabSz="653064" rtl="0" eaLnBrk="1" latinLnBrk="0" hangingPunct="1">
+      <a:defRPr sz="857" kern="1200">
         <a:solidFill>
           <a:schemeClr val="tx1"/>
         </a:solidFill>
@@ -3048,8 +3048,8 @@
         <a:cs typeface="+mn-cs"/>
       </a:defRPr>
     </a:lvl4pPr>
-    <a:lvl5pPr marL="1828800" algn="l" defTabSz="914400" rtl="0" eaLnBrk="1" latinLnBrk="0" hangingPunct="1">
-      <a:defRPr sz="1200" kern="1200">
+    <a:lvl5pPr marL="1306129" algn="l" defTabSz="653064" rtl="0" eaLnBrk="1" latinLnBrk="0" hangingPunct="1">
+      <a:defRPr sz="857" kern="1200">
         <a:solidFill>
           <a:schemeClr val="tx1"/>
         </a:solidFill>
@@ -3058,8 +3058,8 @@
         <a:cs typeface="+mn-cs"/>
       </a:defRPr>
     </a:lvl5pPr>
-    <a:lvl6pPr marL="2286000" algn="l" defTabSz="914400" rtl="0" eaLnBrk="1" latinLnBrk="0" hangingPunct="1">
-      <a:defRPr sz="1200" kern="1200">
+    <a:lvl6pPr marL="1632661" algn="l" defTabSz="653064" rtl="0" eaLnBrk="1" latinLnBrk="0" hangingPunct="1">
+      <a:defRPr sz="857" kern="1200">
         <a:solidFill>
           <a:schemeClr val="tx1"/>
         </a:solidFill>
@@ -3068,8 +3068,8 @@
         <a:cs typeface="+mn-cs"/>
       </a:defRPr>
     </a:lvl6pPr>
-    <a:lvl7pPr marL="2743200" algn="l" defTabSz="914400" rtl="0" eaLnBrk="1" latinLnBrk="0" hangingPunct="1">
-      <a:defRPr sz="1200" kern="1200">
+    <a:lvl7pPr marL="1959193" algn="l" defTabSz="653064" rtl="0" eaLnBrk="1" latinLnBrk="0" hangingPunct="1">
+      <a:defRPr sz="857" kern="1200">
         <a:solidFill>
           <a:schemeClr val="tx1"/>
         </a:solidFill>
@@ -3078,8 +3078,8 @@
         <a:cs typeface="+mn-cs"/>
       </a:defRPr>
     </a:lvl7pPr>
-    <a:lvl8pPr marL="3200400" algn="l" defTabSz="914400" rtl="0" eaLnBrk="1" latinLnBrk="0" hangingPunct="1">
-      <a:defRPr sz="1200" kern="1200">
+    <a:lvl8pPr marL="2285726" algn="l" defTabSz="653064" rtl="0" eaLnBrk="1" latinLnBrk="0" hangingPunct="1">
+      <a:defRPr sz="857" kern="1200">
         <a:solidFill>
           <a:schemeClr val="tx1"/>
         </a:solidFill>
@@ -3088,8 +3088,8 @@
         <a:cs typeface="+mn-cs"/>
       </a:defRPr>
     </a:lvl8pPr>
-    <a:lvl9pPr marL="3657600" algn="l" defTabSz="914400" rtl="0" eaLnBrk="1" latinLnBrk="0" hangingPunct="1">
-      <a:defRPr sz="1200" kern="1200">
+    <a:lvl9pPr marL="2612258" algn="l" defTabSz="653064" rtl="0" eaLnBrk="1" latinLnBrk="0" hangingPunct="1">
+      <a:defRPr sz="857" kern="1200">
         <a:solidFill>
           <a:schemeClr val="tx1"/>
         </a:solidFill>
@@ -3129,7 +3129,12 @@
             <p:ph type="sldImg"/>
           </p:nvPr>
         </p:nvSpPr>
-        <p:spPr/>
+        <p:spPr>
+          <a:xfrm>
+            <a:off x="1114425" y="1143000"/>
+            <a:ext cx="4629150" cy="3086100"/>
+          </a:xfrm>
+        </p:spPr>
       </p:sp>
       <p:sp>
         <p:nvSpPr>
@@ -3282,8 +3287,8 @@
         </p:nvSpPr>
         <p:spPr>
           <a:xfrm>
-            <a:off x="6400800" y="990600"/>
-            <a:ext cx="31089600" cy="2514540"/>
+            <a:off x="4800600" y="660400"/>
+            <a:ext cx="23317200" cy="1676360"/>
           </a:xfrm>
         </p:spPr>
         <p:txBody>
@@ -3309,8 +3314,8 @@
         </p:nvSpPr>
         <p:spPr bwMode="auto">
           <a:xfrm>
-            <a:off x="6400800" y="3588603"/>
-            <a:ext cx="31089600" cy="830997"/>
+            <a:off x="4800600" y="2392402"/>
+            <a:ext cx="23317200" cy="553998"/>
           </a:xfrm>
         </p:spPr>
         <p:txBody>
@@ -3323,7 +3328,7 @@
                 <a:spcPts val="0"/>
               </a:spcBef>
               <a:buNone/>
-              <a:defRPr sz="2400">
+              <a:defRPr sz="1600">
                 <a:solidFill>
                   <a:schemeClr val="bg1"/>
                 </a:solidFill>
@@ -3334,7 +3339,7 @@
                 <a:spcPts val="0"/>
               </a:spcBef>
               <a:buNone/>
-              <a:defRPr sz="2400">
+              <a:defRPr sz="1600">
                 <a:solidFill>
                   <a:schemeClr val="bg1"/>
                 </a:solidFill>
@@ -3345,7 +3350,7 @@
                 <a:spcPts val="0"/>
               </a:spcBef>
               <a:buNone/>
-              <a:defRPr sz="2400">
+              <a:defRPr sz="1600">
                 <a:solidFill>
                   <a:schemeClr val="bg1"/>
                 </a:solidFill>
@@ -3356,7 +3361,7 @@
                 <a:spcPts val="0"/>
               </a:spcBef>
               <a:buNone/>
-              <a:defRPr sz="2400">
+              <a:defRPr sz="1600">
                 <a:solidFill>
                   <a:schemeClr val="bg1"/>
                 </a:solidFill>
@@ -3367,7 +3372,7 @@
                 <a:spcPts val="0"/>
               </a:spcBef>
               <a:buNone/>
-              <a:defRPr sz="2400">
+              <a:defRPr sz="1600">
                 <a:solidFill>
                   <a:schemeClr val="bg1"/>
                 </a:solidFill>
@@ -3378,7 +3383,7 @@
                 <a:spcPts val="0"/>
               </a:spcBef>
               <a:buNone/>
-              <a:defRPr sz="2400">
+              <a:defRPr sz="1600">
                 <a:solidFill>
                   <a:schemeClr val="bg1"/>
                 </a:solidFill>
@@ -3389,7 +3394,7 @@
                 <a:spcPts val="0"/>
               </a:spcBef>
               <a:buNone/>
-              <a:defRPr sz="2400">
+              <a:defRPr sz="1600">
                 <a:solidFill>
                   <a:schemeClr val="bg1"/>
                 </a:solidFill>
@@ -3400,7 +3405,7 @@
                 <a:spcPts val="0"/>
               </a:spcBef>
               <a:buNone/>
-              <a:defRPr sz="2400">
+              <a:defRPr sz="1600">
                 <a:solidFill>
                   <a:schemeClr val="bg1"/>
                 </a:solidFill>
@@ -3411,7 +3416,7 @@
                 <a:spcPts val="0"/>
               </a:spcBef>
               <a:buNone/>
-              <a:defRPr sz="2400">
+              <a:defRPr sz="1600">
                 <a:solidFill>
                   <a:schemeClr val="bg1"/>
                 </a:solidFill>
@@ -3444,7 +3449,7 @@
           <a:p>
             <a:fld id="{ECAA57DF-1C19-4726-AB84-014692BAD8F5}" type="datetimeFigureOut">
               <a:rPr lang="en-US" smtClean="0"/>
-              <a:t>4/14/2019</a:t>
+              <a:t>4/15/2019</a:t>
             </a:fld>
             <a:endParaRPr lang="en-US"/>
           </a:p>
@@ -3504,8 +3509,8 @@
         </p:nvSpPr>
         <p:spPr>
           <a:xfrm>
-            <a:off x="1143000" y="5852160"/>
-            <a:ext cx="12801600" cy="1219200"/>
+            <a:off x="857250" y="3901440"/>
+            <a:ext cx="9601200" cy="812800"/>
           </a:xfrm>
           <a:prstGeom prst="round1Rect">
             <a:avLst/>
@@ -3524,7 +3529,7 @@
                 <a:spcPts val="0"/>
               </a:spcBef>
               <a:buNone/>
-              <a:defRPr sz="6000" cap="all" baseline="0">
+              <a:defRPr sz="4000" cap="all" baseline="0">
                 <a:solidFill>
                   <a:schemeClr val="bg1"/>
                 </a:solidFill>
@@ -3536,7 +3541,7 @@
                 <a:spcPts val="0"/>
               </a:spcBef>
               <a:buNone/>
-              <a:defRPr sz="6000" cap="all" baseline="0">
+              <a:defRPr sz="4000" cap="all" baseline="0">
                 <a:solidFill>
                   <a:schemeClr val="bg1"/>
                 </a:solidFill>
@@ -3548,7 +3553,7 @@
                 <a:spcPts val="0"/>
               </a:spcBef>
               <a:buNone/>
-              <a:defRPr sz="6000" cap="all" baseline="0">
+              <a:defRPr sz="4000" cap="all" baseline="0">
                 <a:solidFill>
                   <a:schemeClr val="bg1"/>
                 </a:solidFill>
@@ -3560,7 +3565,7 @@
                 <a:spcPts val="0"/>
               </a:spcBef>
               <a:buNone/>
-              <a:defRPr sz="6000" cap="all" baseline="0">
+              <a:defRPr sz="4000" cap="all" baseline="0">
                 <a:solidFill>
                   <a:schemeClr val="bg1"/>
                 </a:solidFill>
@@ -3572,7 +3577,7 @@
                 <a:spcPts val="0"/>
               </a:spcBef>
               <a:buNone/>
-              <a:defRPr sz="6000" cap="all" baseline="0">
+              <a:defRPr sz="4000" cap="all" baseline="0">
                 <a:solidFill>
                   <a:schemeClr val="bg1"/>
                 </a:solidFill>
@@ -3584,7 +3589,7 @@
                 <a:spcPts val="0"/>
               </a:spcBef>
               <a:buNone/>
-              <a:defRPr sz="6000" cap="all" baseline="0">
+              <a:defRPr sz="4000" cap="all" baseline="0">
                 <a:solidFill>
                   <a:schemeClr val="bg1"/>
                 </a:solidFill>
@@ -3596,7 +3601,7 @@
                 <a:spcPts val="0"/>
               </a:spcBef>
               <a:buNone/>
-              <a:defRPr sz="6000" cap="all" baseline="0">
+              <a:defRPr sz="4000" cap="all" baseline="0">
                 <a:solidFill>
                   <a:schemeClr val="bg1"/>
                 </a:solidFill>
@@ -3608,7 +3613,7 @@
                 <a:spcPts val="0"/>
               </a:spcBef>
               <a:buNone/>
-              <a:defRPr sz="6000" cap="all" baseline="0">
+              <a:defRPr sz="4000" cap="all" baseline="0">
                 <a:solidFill>
                   <a:schemeClr val="bg1"/>
                 </a:solidFill>
@@ -3620,7 +3625,7 @@
                 <a:spcPts val="0"/>
               </a:spcBef>
               <a:buNone/>
-              <a:defRPr sz="6000" cap="all" baseline="0">
+              <a:defRPr sz="4000" cap="all" baseline="0">
                 <a:solidFill>
                   <a:schemeClr val="bg1"/>
                 </a:solidFill>
@@ -3649,8 +3654,8 @@
         </p:nvSpPr>
         <p:spPr>
           <a:xfrm>
-            <a:off x="1143000" y="7071360"/>
-            <a:ext cx="12801600" cy="6858000"/>
+            <a:off x="857250" y="4714240"/>
+            <a:ext cx="9601200" cy="4572000"/>
           </a:xfrm>
         </p:spPr>
         <p:txBody>
@@ -3752,8 +3757,8 @@
         </p:nvSpPr>
         <p:spPr>
           <a:xfrm>
-            <a:off x="1143000" y="15032736"/>
-            <a:ext cx="12801600" cy="1219200"/>
+            <a:off x="857250" y="10021824"/>
+            <a:ext cx="9601200" cy="812800"/>
           </a:xfrm>
           <a:prstGeom prst="round1Rect">
             <a:avLst/>
@@ -3772,7 +3777,7 @@
                 <a:spcPts val="0"/>
               </a:spcBef>
               <a:buNone/>
-              <a:defRPr sz="6000" cap="all" baseline="0">
+              <a:defRPr sz="4000" cap="all" baseline="0">
                 <a:solidFill>
                   <a:schemeClr val="bg1"/>
                 </a:solidFill>
@@ -3784,7 +3789,7 @@
                 <a:spcPts val="0"/>
               </a:spcBef>
               <a:buNone/>
-              <a:defRPr sz="6000" cap="all" baseline="0">
+              <a:defRPr sz="4000" cap="all" baseline="0">
                 <a:solidFill>
                   <a:schemeClr val="bg1"/>
                 </a:solidFill>
@@ -3796,7 +3801,7 @@
                 <a:spcPts val="0"/>
               </a:spcBef>
               <a:buNone/>
-              <a:defRPr sz="6000" cap="all" baseline="0">
+              <a:defRPr sz="4000" cap="all" baseline="0">
                 <a:solidFill>
                   <a:schemeClr val="bg1"/>
                 </a:solidFill>
@@ -3808,7 +3813,7 @@
                 <a:spcPts val="0"/>
               </a:spcBef>
               <a:buNone/>
-              <a:defRPr sz="6000" cap="all" baseline="0">
+              <a:defRPr sz="4000" cap="all" baseline="0">
                 <a:solidFill>
                   <a:schemeClr val="bg1"/>
                 </a:solidFill>
@@ -3820,7 +3825,7 @@
                 <a:spcPts val="0"/>
               </a:spcBef>
               <a:buNone/>
-              <a:defRPr sz="6000" cap="all" baseline="0">
+              <a:defRPr sz="4000" cap="all" baseline="0">
                 <a:solidFill>
                   <a:schemeClr val="bg1"/>
                 </a:solidFill>
@@ -3832,7 +3837,7 @@
                 <a:spcPts val="0"/>
               </a:spcBef>
               <a:buNone/>
-              <a:defRPr sz="6000" cap="all" baseline="0">
+              <a:defRPr sz="4000" cap="all" baseline="0">
                 <a:solidFill>
                   <a:schemeClr val="bg1"/>
                 </a:solidFill>
@@ -3844,7 +3849,7 @@
                 <a:spcPts val="0"/>
               </a:spcBef>
               <a:buNone/>
-              <a:defRPr sz="6000" cap="all" baseline="0">
+              <a:defRPr sz="4000" cap="all" baseline="0">
                 <a:solidFill>
                   <a:schemeClr val="bg1"/>
                 </a:solidFill>
@@ -3856,7 +3861,7 @@
                 <a:spcPts val="0"/>
               </a:spcBef>
               <a:buNone/>
-              <a:defRPr sz="6000" cap="all" baseline="0">
+              <a:defRPr sz="4000" cap="all" baseline="0">
                 <a:solidFill>
                   <a:schemeClr val="bg1"/>
                 </a:solidFill>
@@ -3868,7 +3873,7 @@
                 <a:spcPts val="0"/>
               </a:spcBef>
               <a:buNone/>
-              <a:defRPr sz="6000" cap="all" baseline="0">
+              <a:defRPr sz="4000" cap="all" baseline="0">
                 <a:solidFill>
                   <a:schemeClr val="bg1"/>
                 </a:solidFill>
@@ -3897,8 +3902,8 @@
         </p:nvSpPr>
         <p:spPr>
           <a:xfrm>
-            <a:off x="1143000" y="16251936"/>
-            <a:ext cx="12801600" cy="9088165"/>
+            <a:off x="857250" y="10834624"/>
+            <a:ext cx="9601200" cy="6058777"/>
           </a:xfrm>
         </p:spPr>
         <p:txBody>
@@ -4000,8 +4005,8 @@
         </p:nvSpPr>
         <p:spPr>
           <a:xfrm>
-            <a:off x="1143000" y="25831800"/>
-            <a:ext cx="12801600" cy="1219200"/>
+            <a:off x="857250" y="17221200"/>
+            <a:ext cx="9601200" cy="812800"/>
           </a:xfrm>
           <a:prstGeom prst="round1Rect">
             <a:avLst/>
@@ -4020,7 +4025,7 @@
                 <a:spcPts val="0"/>
               </a:spcBef>
               <a:buNone/>
-              <a:defRPr sz="6000" cap="all" baseline="0">
+              <a:defRPr sz="4000" cap="all" baseline="0">
                 <a:solidFill>
                   <a:schemeClr val="bg1"/>
                 </a:solidFill>
@@ -4032,7 +4037,7 @@
                 <a:spcPts val="0"/>
               </a:spcBef>
               <a:buNone/>
-              <a:defRPr sz="6000" cap="all" baseline="0">
+              <a:defRPr sz="4000" cap="all" baseline="0">
                 <a:solidFill>
                   <a:schemeClr val="bg1"/>
                 </a:solidFill>
@@ -4044,7 +4049,7 @@
                 <a:spcPts val="0"/>
               </a:spcBef>
               <a:buNone/>
-              <a:defRPr sz="6000" cap="all" baseline="0">
+              <a:defRPr sz="4000" cap="all" baseline="0">
                 <a:solidFill>
                   <a:schemeClr val="bg1"/>
                 </a:solidFill>
@@ -4056,7 +4061,7 @@
                 <a:spcPts val="0"/>
               </a:spcBef>
               <a:buNone/>
-              <a:defRPr sz="6000" cap="all" baseline="0">
+              <a:defRPr sz="4000" cap="all" baseline="0">
                 <a:solidFill>
                   <a:schemeClr val="bg1"/>
                 </a:solidFill>
@@ -4068,7 +4073,7 @@
                 <a:spcPts val="0"/>
               </a:spcBef>
               <a:buNone/>
-              <a:defRPr sz="6000" cap="all" baseline="0">
+              <a:defRPr sz="4000" cap="all" baseline="0">
                 <a:solidFill>
                   <a:schemeClr val="bg1"/>
                 </a:solidFill>
@@ -4080,7 +4085,7 @@
                 <a:spcPts val="0"/>
               </a:spcBef>
               <a:buNone/>
-              <a:defRPr sz="6000" cap="all" baseline="0">
+              <a:defRPr sz="4000" cap="all" baseline="0">
                 <a:solidFill>
                   <a:schemeClr val="bg1"/>
                 </a:solidFill>
@@ -4092,7 +4097,7 @@
                 <a:spcPts val="0"/>
               </a:spcBef>
               <a:buNone/>
-              <a:defRPr sz="6000" cap="all" baseline="0">
+              <a:defRPr sz="4000" cap="all" baseline="0">
                 <a:solidFill>
                   <a:schemeClr val="bg1"/>
                 </a:solidFill>
@@ -4104,7 +4109,7 @@
                 <a:spcPts val="0"/>
               </a:spcBef>
               <a:buNone/>
-              <a:defRPr sz="6000" cap="all" baseline="0">
+              <a:defRPr sz="4000" cap="all" baseline="0">
                 <a:solidFill>
                   <a:schemeClr val="bg1"/>
                 </a:solidFill>
@@ -4116,7 +4121,7 @@
                 <a:spcPts val="0"/>
               </a:spcBef>
               <a:buNone/>
-              <a:defRPr sz="6000" cap="all" baseline="0">
+              <a:defRPr sz="4000" cap="all" baseline="0">
                 <a:solidFill>
                   <a:schemeClr val="bg1"/>
                 </a:solidFill>
@@ -4145,8 +4150,8 @@
         </p:nvSpPr>
         <p:spPr>
           <a:xfrm>
-            <a:off x="1143000" y="27057096"/>
-            <a:ext cx="12801600" cy="4572000"/>
+            <a:off x="857250" y="18038064"/>
+            <a:ext cx="9601200" cy="3048000"/>
           </a:xfrm>
         </p:spPr>
         <p:txBody>
@@ -4248,8 +4253,8 @@
         </p:nvSpPr>
         <p:spPr>
           <a:xfrm>
-            <a:off x="15544800" y="5852160"/>
-            <a:ext cx="12801600" cy="1219200"/>
+            <a:off x="11658600" y="3901440"/>
+            <a:ext cx="9601200" cy="812800"/>
           </a:xfrm>
           <a:prstGeom prst="round1Rect">
             <a:avLst/>
@@ -4268,7 +4273,7 @@
                 <a:spcPts val="0"/>
               </a:spcBef>
               <a:buNone/>
-              <a:defRPr sz="6000" cap="all" baseline="0">
+              <a:defRPr sz="4000" cap="all" baseline="0">
                 <a:solidFill>
                   <a:schemeClr val="bg1"/>
                 </a:solidFill>
@@ -4280,7 +4285,7 @@
                 <a:spcPts val="0"/>
               </a:spcBef>
               <a:buNone/>
-              <a:defRPr sz="6000" cap="all" baseline="0">
+              <a:defRPr sz="4000" cap="all" baseline="0">
                 <a:solidFill>
                   <a:schemeClr val="bg1"/>
                 </a:solidFill>
@@ -4292,7 +4297,7 @@
                 <a:spcPts val="0"/>
               </a:spcBef>
               <a:buNone/>
-              <a:defRPr sz="6000" cap="all" baseline="0">
+              <a:defRPr sz="4000" cap="all" baseline="0">
                 <a:solidFill>
                   <a:schemeClr val="bg1"/>
                 </a:solidFill>
@@ -4304,7 +4309,7 @@
                 <a:spcPts val="0"/>
               </a:spcBef>
               <a:buNone/>
-              <a:defRPr sz="6000" cap="all" baseline="0">
+              <a:defRPr sz="4000" cap="all" baseline="0">
                 <a:solidFill>
                   <a:schemeClr val="bg1"/>
                 </a:solidFill>
@@ -4316,7 +4321,7 @@
                 <a:spcPts val="0"/>
               </a:spcBef>
               <a:buNone/>
-              <a:defRPr sz="6000" cap="all" baseline="0">
+              <a:defRPr sz="4000" cap="all" baseline="0">
                 <a:solidFill>
                   <a:schemeClr val="bg1"/>
                 </a:solidFill>
@@ -4328,7 +4333,7 @@
                 <a:spcPts val="0"/>
               </a:spcBef>
               <a:buNone/>
-              <a:defRPr sz="6000" cap="all" baseline="0">
+              <a:defRPr sz="4000" cap="all" baseline="0">
                 <a:solidFill>
                   <a:schemeClr val="bg1"/>
                 </a:solidFill>
@@ -4340,7 +4345,7 @@
                 <a:spcPts val="0"/>
               </a:spcBef>
               <a:buNone/>
-              <a:defRPr sz="6000" cap="all" baseline="0">
+              <a:defRPr sz="4000" cap="all" baseline="0">
                 <a:solidFill>
                   <a:schemeClr val="bg1"/>
                 </a:solidFill>
@@ -4352,7 +4357,7 @@
                 <a:spcPts val="0"/>
               </a:spcBef>
               <a:buNone/>
-              <a:defRPr sz="6000" cap="all" baseline="0">
+              <a:defRPr sz="4000" cap="all" baseline="0">
                 <a:solidFill>
                   <a:schemeClr val="bg1"/>
                 </a:solidFill>
@@ -4364,7 +4369,7 @@
                 <a:spcPts val="0"/>
               </a:spcBef>
               <a:buNone/>
-              <a:defRPr sz="6000" cap="all" baseline="0">
+              <a:defRPr sz="4000" cap="all" baseline="0">
                 <a:solidFill>
                   <a:schemeClr val="bg1"/>
                 </a:solidFill>
@@ -4393,8 +4398,8 @@
         </p:nvSpPr>
         <p:spPr>
           <a:xfrm>
-            <a:off x="15544800" y="7071360"/>
-            <a:ext cx="12801600" cy="4572000"/>
+            <a:off x="11658600" y="4714240"/>
+            <a:ext cx="9601200" cy="3048000"/>
           </a:xfrm>
         </p:spPr>
         <p:txBody>
@@ -4496,8 +4501,8 @@
         </p:nvSpPr>
         <p:spPr>
           <a:xfrm>
-            <a:off x="15544800" y="11948160"/>
-            <a:ext cx="12801600" cy="6172200"/>
+            <a:off x="11658600" y="7965440"/>
+            <a:ext cx="9601200" cy="4114800"/>
           </a:xfrm>
         </p:spPr>
         <p:txBody>
@@ -4599,8 +4604,8 @@
         </p:nvSpPr>
         <p:spPr>
           <a:xfrm>
-            <a:off x="15544800" y="23469600"/>
-            <a:ext cx="12801600" cy="1752600"/>
+            <a:off x="11658600" y="15646400"/>
+            <a:ext cx="9601200" cy="1168400"/>
           </a:xfrm>
         </p:spPr>
         <p:txBody>
@@ -4653,8 +4658,8 @@
         </p:nvSpPr>
         <p:spPr>
           <a:xfrm>
-            <a:off x="15544800" y="25831800"/>
-            <a:ext cx="12801600" cy="1219200"/>
+            <a:off x="11658600" y="17221200"/>
+            <a:ext cx="9601200" cy="812800"/>
           </a:xfrm>
           <a:prstGeom prst="round1Rect">
             <a:avLst/>
@@ -4673,7 +4678,7 @@
                 <a:spcPts val="0"/>
               </a:spcBef>
               <a:buNone/>
-              <a:defRPr sz="6000" cap="all" baseline="0">
+              <a:defRPr sz="4000" cap="all" baseline="0">
                 <a:solidFill>
                   <a:schemeClr val="bg1"/>
                 </a:solidFill>
@@ -4685,7 +4690,7 @@
                 <a:spcPts val="0"/>
               </a:spcBef>
               <a:buNone/>
-              <a:defRPr sz="6000" cap="all" baseline="0">
+              <a:defRPr sz="4000" cap="all" baseline="0">
                 <a:solidFill>
                   <a:schemeClr val="bg1"/>
                 </a:solidFill>
@@ -4697,7 +4702,7 @@
                 <a:spcPts val="0"/>
               </a:spcBef>
               <a:buNone/>
-              <a:defRPr sz="6000" cap="all" baseline="0">
+              <a:defRPr sz="4000" cap="all" baseline="0">
                 <a:solidFill>
                   <a:schemeClr val="bg1"/>
                 </a:solidFill>
@@ -4709,7 +4714,7 @@
                 <a:spcPts val="0"/>
               </a:spcBef>
               <a:buNone/>
-              <a:defRPr sz="6000" cap="all" baseline="0">
+              <a:defRPr sz="4000" cap="all" baseline="0">
                 <a:solidFill>
                   <a:schemeClr val="bg1"/>
                 </a:solidFill>
@@ -4721,7 +4726,7 @@
                 <a:spcPts val="0"/>
               </a:spcBef>
               <a:buNone/>
-              <a:defRPr sz="6000" cap="all" baseline="0">
+              <a:defRPr sz="4000" cap="all" baseline="0">
                 <a:solidFill>
                   <a:schemeClr val="bg1"/>
                 </a:solidFill>
@@ -4733,7 +4738,7 @@
                 <a:spcPts val="0"/>
               </a:spcBef>
               <a:buNone/>
-              <a:defRPr sz="6000" cap="all" baseline="0">
+              <a:defRPr sz="4000" cap="all" baseline="0">
                 <a:solidFill>
                   <a:schemeClr val="bg1"/>
                 </a:solidFill>
@@ -4745,7 +4750,7 @@
                 <a:spcPts val="0"/>
               </a:spcBef>
               <a:buNone/>
-              <a:defRPr sz="6000" cap="all" baseline="0">
+              <a:defRPr sz="4000" cap="all" baseline="0">
                 <a:solidFill>
                   <a:schemeClr val="bg1"/>
                 </a:solidFill>
@@ -4757,7 +4762,7 @@
                 <a:spcPts val="0"/>
               </a:spcBef>
               <a:buNone/>
-              <a:defRPr sz="6000" cap="all" baseline="0">
+              <a:defRPr sz="4000" cap="all" baseline="0">
                 <a:solidFill>
                   <a:schemeClr val="bg1"/>
                 </a:solidFill>
@@ -4769,7 +4774,7 @@
                 <a:spcPts val="0"/>
               </a:spcBef>
               <a:buNone/>
-              <a:defRPr sz="6000" cap="all" baseline="0">
+              <a:defRPr sz="4000" cap="all" baseline="0">
                 <a:solidFill>
                   <a:schemeClr val="bg1"/>
                 </a:solidFill>
@@ -4798,8 +4803,8 @@
         </p:nvSpPr>
         <p:spPr>
           <a:xfrm>
-            <a:off x="15544800" y="27057096"/>
-            <a:ext cx="12801600" cy="4572000"/>
+            <a:off x="11658600" y="18038064"/>
+            <a:ext cx="9601200" cy="3048000"/>
           </a:xfrm>
         </p:spPr>
         <p:txBody>
@@ -4901,8 +4906,8 @@
         </p:nvSpPr>
         <p:spPr>
           <a:xfrm>
-            <a:off x="29900880" y="5852160"/>
-            <a:ext cx="12801600" cy="1219200"/>
+            <a:off x="22425660" y="3901440"/>
+            <a:ext cx="9601200" cy="812800"/>
           </a:xfrm>
           <a:prstGeom prst="round1Rect">
             <a:avLst/>
@@ -4921,7 +4926,7 @@
                 <a:spcPts val="0"/>
               </a:spcBef>
               <a:buNone/>
-              <a:defRPr sz="6000" cap="all" baseline="0">
+              <a:defRPr sz="4000" cap="all" baseline="0">
                 <a:solidFill>
                   <a:schemeClr val="bg1"/>
                 </a:solidFill>
@@ -4933,7 +4938,7 @@
                 <a:spcPts val="0"/>
               </a:spcBef>
               <a:buNone/>
-              <a:defRPr sz="6000" cap="all" baseline="0">
+              <a:defRPr sz="4000" cap="all" baseline="0">
                 <a:solidFill>
                   <a:schemeClr val="bg1"/>
                 </a:solidFill>
@@ -4945,7 +4950,7 @@
                 <a:spcPts val="0"/>
               </a:spcBef>
               <a:buNone/>
-              <a:defRPr sz="6000" cap="all" baseline="0">
+              <a:defRPr sz="4000" cap="all" baseline="0">
                 <a:solidFill>
                   <a:schemeClr val="bg1"/>
                 </a:solidFill>
@@ -4957,7 +4962,7 @@
                 <a:spcPts val="0"/>
               </a:spcBef>
               <a:buNone/>
-              <a:defRPr sz="6000" cap="all" baseline="0">
+              <a:defRPr sz="4000" cap="all" baseline="0">
                 <a:solidFill>
                   <a:schemeClr val="bg1"/>
                 </a:solidFill>
@@ -4969,7 +4974,7 @@
                 <a:spcPts val="0"/>
               </a:spcBef>
               <a:buNone/>
-              <a:defRPr sz="6000" cap="all" baseline="0">
+              <a:defRPr sz="4000" cap="all" baseline="0">
                 <a:solidFill>
                   <a:schemeClr val="bg1"/>
                 </a:solidFill>
@@ -4981,7 +4986,7 @@
                 <a:spcPts val="0"/>
               </a:spcBef>
               <a:buNone/>
-              <a:defRPr sz="6000" cap="all" baseline="0">
+              <a:defRPr sz="4000" cap="all" baseline="0">
                 <a:solidFill>
                   <a:schemeClr val="bg1"/>
                 </a:solidFill>
@@ -4993,7 +4998,7 @@
                 <a:spcPts val="0"/>
               </a:spcBef>
               <a:buNone/>
-              <a:defRPr sz="6000" cap="all" baseline="0">
+              <a:defRPr sz="4000" cap="all" baseline="0">
                 <a:solidFill>
                   <a:schemeClr val="bg1"/>
                 </a:solidFill>
@@ -5005,7 +5010,7 @@
                 <a:spcPts val="0"/>
               </a:spcBef>
               <a:buNone/>
-              <a:defRPr sz="6000" cap="all" baseline="0">
+              <a:defRPr sz="4000" cap="all" baseline="0">
                 <a:solidFill>
                   <a:schemeClr val="bg1"/>
                 </a:solidFill>
@@ -5017,7 +5022,7 @@
                 <a:spcPts val="0"/>
               </a:spcBef>
               <a:buNone/>
-              <a:defRPr sz="6000" cap="all" baseline="0">
+              <a:defRPr sz="4000" cap="all" baseline="0">
                 <a:solidFill>
                   <a:schemeClr val="bg1"/>
                 </a:solidFill>
@@ -5046,8 +5051,8 @@
         </p:nvSpPr>
         <p:spPr>
           <a:xfrm>
-            <a:off x="29900880" y="7071360"/>
-            <a:ext cx="12801600" cy="7315200"/>
+            <a:off x="22425660" y="4714240"/>
+            <a:ext cx="9601200" cy="4876800"/>
           </a:xfrm>
         </p:spPr>
         <p:txBody>
@@ -5149,8 +5154,8 @@
         </p:nvSpPr>
         <p:spPr>
           <a:xfrm>
-            <a:off x="29900880" y="15837408"/>
-            <a:ext cx="12801600" cy="7315200"/>
+            <a:off x="22425660" y="10558272"/>
+            <a:ext cx="9601200" cy="4876800"/>
           </a:xfrm>
         </p:spPr>
         <p:txBody>
@@ -5252,8 +5257,8 @@
         </p:nvSpPr>
         <p:spPr>
           <a:xfrm>
-            <a:off x="29900880" y="25831800"/>
-            <a:ext cx="12801600" cy="1219200"/>
+            <a:off x="22425660" y="17221200"/>
+            <a:ext cx="9601200" cy="812800"/>
           </a:xfrm>
           <a:prstGeom prst="round1Rect">
             <a:avLst/>
@@ -5272,7 +5277,7 @@
                 <a:spcPts val="0"/>
               </a:spcBef>
               <a:buNone/>
-              <a:defRPr sz="6000" cap="all" baseline="0">
+              <a:defRPr sz="4000" cap="all" baseline="0">
                 <a:solidFill>
                   <a:schemeClr val="bg1"/>
                 </a:solidFill>
@@ -5284,7 +5289,7 @@
                 <a:spcPts val="0"/>
               </a:spcBef>
               <a:buNone/>
-              <a:defRPr sz="6000" cap="all" baseline="0">
+              <a:defRPr sz="4000" cap="all" baseline="0">
                 <a:solidFill>
                   <a:schemeClr val="bg1"/>
                 </a:solidFill>
@@ -5296,7 +5301,7 @@
                 <a:spcPts val="0"/>
               </a:spcBef>
               <a:buNone/>
-              <a:defRPr sz="6000" cap="all" baseline="0">
+              <a:defRPr sz="4000" cap="all" baseline="0">
                 <a:solidFill>
                   <a:schemeClr val="bg1"/>
                 </a:solidFill>
@@ -5308,7 +5313,7 @@
                 <a:spcPts val="0"/>
               </a:spcBef>
               <a:buNone/>
-              <a:defRPr sz="6000" cap="all" baseline="0">
+              <a:defRPr sz="4000" cap="all" baseline="0">
                 <a:solidFill>
                   <a:schemeClr val="bg1"/>
                 </a:solidFill>
@@ -5320,7 +5325,7 @@
                 <a:spcPts val="0"/>
               </a:spcBef>
               <a:buNone/>
-              <a:defRPr sz="6000" cap="all" baseline="0">
+              <a:defRPr sz="4000" cap="all" baseline="0">
                 <a:solidFill>
                   <a:schemeClr val="bg1"/>
                 </a:solidFill>
@@ -5332,7 +5337,7 @@
                 <a:spcPts val="0"/>
               </a:spcBef>
               <a:buNone/>
-              <a:defRPr sz="6000" cap="all" baseline="0">
+              <a:defRPr sz="4000" cap="all" baseline="0">
                 <a:solidFill>
                   <a:schemeClr val="bg1"/>
                 </a:solidFill>
@@ -5344,7 +5349,7 @@
                 <a:spcPts val="0"/>
               </a:spcBef>
               <a:buNone/>
-              <a:defRPr sz="6000" cap="all" baseline="0">
+              <a:defRPr sz="4000" cap="all" baseline="0">
                 <a:solidFill>
                   <a:schemeClr val="bg1"/>
                 </a:solidFill>
@@ -5356,7 +5361,7 @@
                 <a:spcPts val="0"/>
               </a:spcBef>
               <a:buNone/>
-              <a:defRPr sz="6000" cap="all" baseline="0">
+              <a:defRPr sz="4000" cap="all" baseline="0">
                 <a:solidFill>
                   <a:schemeClr val="bg1"/>
                 </a:solidFill>
@@ -5368,7 +5373,7 @@
                 <a:spcPts val="0"/>
               </a:spcBef>
               <a:buNone/>
-              <a:defRPr sz="6000" cap="all" baseline="0">
+              <a:defRPr sz="4000" cap="all" baseline="0">
                 <a:solidFill>
                   <a:schemeClr val="bg1"/>
                 </a:solidFill>
@@ -5397,8 +5402,8 @@
         </p:nvSpPr>
         <p:spPr>
           <a:xfrm>
-            <a:off x="29900880" y="27057096"/>
-            <a:ext cx="12801600" cy="4572000"/>
+            <a:off x="22425660" y="18038064"/>
+            <a:ext cx="9601200" cy="3048000"/>
           </a:xfrm>
         </p:spPr>
         <p:txBody>
@@ -5501,12 +5506,12 @@
   <p:extLst mod="1">
     <p:ext uri="{DCECCB84-F9BA-43D5-87BE-67443E8EF086}">
       <p15:sldGuideLst xmlns:p15="http://schemas.microsoft.com/office/powerpoint/2012/main">
-        <p15:guide id="1" pos="9168" userDrawn="1">
+        <p15:guide id="1" pos="6876" userDrawn="1">
           <p15:clr>
             <a:srgbClr val="A4A3A4"/>
           </p15:clr>
         </p15:guide>
-        <p15:guide id="2" pos="18480" userDrawn="1">
+        <p15:guide id="2" pos="13860" userDrawn="1">
           <p15:clr>
             <a:srgbClr val="A4A3A4"/>
           </p15:clr>
@@ -5548,7 +5553,7 @@
         <p:spPr bwMode="invGray">
           <a:xfrm>
             <a:off x="0" y="0"/>
-            <a:ext cx="43891200" cy="5029200"/>
+            <a:ext cx="32918400" cy="3352800"/>
           </a:xfrm>
           <a:prstGeom prst="rect">
             <a:avLst/>
@@ -5581,7 +5586,7 @@
           <a:lstStyle/>
           <a:p>
             <a:pPr algn="ctr"/>
-            <a:endParaRPr lang="en-US"/>
+            <a:endParaRPr lang="en-US" sz="3456"/>
           </a:p>
         </p:txBody>
       </p:sp>
@@ -5597,8 +5602,8 @@
         </p:nvSpPr>
         <p:spPr bwMode="auto">
           <a:xfrm>
-            <a:off x="6400800" y="990600"/>
-            <a:ext cx="31089600" cy="2514540"/>
+            <a:off x="4800600" y="660400"/>
+            <a:ext cx="23317200" cy="1676360"/>
           </a:xfrm>
           <a:prstGeom prst="rect">
             <a:avLst/>
@@ -5630,8 +5635,8 @@
         </p:nvSpPr>
         <p:spPr>
           <a:xfrm>
-            <a:off x="6400800" y="6019800"/>
-            <a:ext cx="31089600" cy="23629622"/>
+            <a:off x="4800600" y="4013200"/>
+            <a:ext cx="23317200" cy="15753081"/>
           </a:xfrm>
           <a:prstGeom prst="rect">
             <a:avLst/>
@@ -5692,8 +5697,8 @@
         </p:nvSpPr>
         <p:spPr>
           <a:xfrm>
-            <a:off x="1143000" y="32114698"/>
-            <a:ext cx="9875520" cy="457200"/>
+            <a:off x="857250" y="21409799"/>
+            <a:ext cx="7406640" cy="304800"/>
           </a:xfrm>
           <a:prstGeom prst="rect">
             <a:avLst/>
@@ -5703,7 +5708,7 @@
           <a:bodyPr vert="horz" lIns="91440" tIns="45720" rIns="91440" bIns="45720" rtlCol="0" anchor="ctr"/>
           <a:lstStyle>
             <a:lvl1pPr algn="l">
-              <a:defRPr sz="1600">
+              <a:defRPr sz="1067">
                 <a:solidFill>
                   <a:schemeClr val="tx1">
                     <a:tint val="75000"/>
@@ -5716,7 +5721,7 @@
             <a:fld id="{ECAA57DF-1C19-4726-AB84-014692BAD8F5}" type="datetimeFigureOut">
               <a:rPr lang="en-US" smtClean="0"/>
               <a:pPr/>
-              <a:t>4/14/2019</a:t>
+              <a:t>4/15/2019</a:t>
             </a:fld>
             <a:endParaRPr lang="en-US"/>
           </a:p>
@@ -5734,8 +5739,8 @@
         </p:nvSpPr>
         <p:spPr>
           <a:xfrm>
-            <a:off x="11018520" y="32114698"/>
-            <a:ext cx="21854160" cy="457200"/>
+            <a:off x="8263890" y="21409799"/>
+            <a:ext cx="16390620" cy="304800"/>
           </a:xfrm>
           <a:prstGeom prst="rect">
             <a:avLst/>
@@ -5745,7 +5750,7 @@
           <a:bodyPr vert="horz" lIns="91440" tIns="45720" rIns="91440" bIns="45720" rtlCol="0" anchor="ctr"/>
           <a:lstStyle>
             <a:lvl1pPr algn="ctr">
-              <a:defRPr sz="1600">
+              <a:defRPr sz="1067">
                 <a:solidFill>
                   <a:schemeClr val="tx1">
                     <a:tint val="75000"/>
@@ -5771,8 +5776,8 @@
         </p:nvSpPr>
         <p:spPr>
           <a:xfrm>
-            <a:off x="32872680" y="32114698"/>
-            <a:ext cx="9875520" cy="457200"/>
+            <a:off x="24654510" y="21409799"/>
+            <a:ext cx="7406640" cy="304800"/>
           </a:xfrm>
           <a:prstGeom prst="rect">
             <a:avLst/>
@@ -5782,7 +5787,7 @@
           <a:bodyPr vert="horz" lIns="91440" tIns="45720" rIns="91440" bIns="45720" rtlCol="0" anchor="ctr"/>
           <a:lstStyle>
             <a:lvl1pPr algn="r">
-              <a:defRPr sz="1600">
+              <a:defRPr sz="1067">
                 <a:solidFill>
                   <a:schemeClr val="tx1">
                     <a:tint val="75000"/>
@@ -5814,7 +5819,7 @@
   </p:sldLayoutIdLst>
   <p:txStyles>
     <p:titleStyle>
-      <a:lvl1pPr algn="l" defTabSz="4389120" rtl="0" eaLnBrk="1" latinLnBrk="0" hangingPunct="1">
+      <a:lvl1pPr algn="l" defTabSz="2926226" rtl="0" eaLnBrk="1" latinLnBrk="0" hangingPunct="1">
         <a:lnSpc>
           <a:spcPct val="90000"/>
         </a:lnSpc>
@@ -5822,7 +5827,7 @@
           <a:spcPct val="0"/>
         </a:spcBef>
         <a:buNone/>
-        <a:defRPr sz="8800" b="1" kern="1200">
+        <a:defRPr sz="5867" b="1" kern="1200">
           <a:solidFill>
             <a:schemeClr val="bg1"/>
           </a:solidFill>
@@ -5833,19 +5838,19 @@
       </a:lvl1pPr>
     </p:titleStyle>
     <p:bodyStyle>
-      <a:lvl1pPr marL="457200" indent="-457200" algn="l" defTabSz="4389120" rtl="0" eaLnBrk="1" latinLnBrk="0" hangingPunct="1">
+      <a:lvl1pPr marL="304815" indent="-304815" algn="l" defTabSz="2926226" rtl="0" eaLnBrk="1" latinLnBrk="0" hangingPunct="1">
         <a:lnSpc>
           <a:spcPct val="100000"/>
         </a:lnSpc>
         <a:spcBef>
-          <a:spcPts val="1200"/>
+          <a:spcPts val="800"/>
         </a:spcBef>
         <a:buClr>
           <a:schemeClr val="accent2"/>
         </a:buClr>
         <a:buFont typeface="Arial" panose="020B0604020202020204" pitchFamily="34" charset="0"/>
         <a:buChar char="•"/>
-        <a:defRPr sz="2800" kern="1200">
+        <a:defRPr sz="1867" kern="1200">
           <a:solidFill>
             <a:schemeClr val="tx1"/>
           </a:solidFill>
@@ -5854,19 +5859,19 @@
           <a:cs typeface="+mn-cs"/>
         </a:defRPr>
       </a:lvl1pPr>
-      <a:lvl2pPr marL="1097280" indent="-457200" algn="l" defTabSz="4389120" rtl="0" eaLnBrk="1" latinLnBrk="0" hangingPunct="1">
+      <a:lvl2pPr marL="731557" indent="-304815" algn="l" defTabSz="2926226" rtl="0" eaLnBrk="1" latinLnBrk="0" hangingPunct="1">
         <a:lnSpc>
           <a:spcPct val="100000"/>
         </a:lnSpc>
         <a:spcBef>
-          <a:spcPts val="1200"/>
+          <a:spcPts val="800"/>
         </a:spcBef>
         <a:buClr>
           <a:schemeClr val="accent2"/>
         </a:buClr>
         <a:buFont typeface="Arial" panose="020B0604020202020204" pitchFamily="34" charset="0"/>
         <a:buChar char="•"/>
-        <a:defRPr sz="2400" kern="1200">
+        <a:defRPr sz="1600" kern="1200">
           <a:solidFill>
             <a:schemeClr val="tx1"/>
           </a:solidFill>
@@ -5875,19 +5880,19 @@
           <a:cs typeface="+mn-cs"/>
         </a:defRPr>
       </a:lvl2pPr>
-      <a:lvl3pPr marL="1097280" indent="-457200" algn="l" defTabSz="4389120" rtl="0" eaLnBrk="1" latinLnBrk="0" hangingPunct="1">
+      <a:lvl3pPr marL="731557" indent="-304815" algn="l" defTabSz="2926226" rtl="0" eaLnBrk="1" latinLnBrk="0" hangingPunct="1">
         <a:lnSpc>
           <a:spcPct val="100000"/>
         </a:lnSpc>
         <a:spcBef>
-          <a:spcPts val="1200"/>
+          <a:spcPts val="800"/>
         </a:spcBef>
         <a:buClr>
           <a:schemeClr val="accent2"/>
         </a:buClr>
         <a:buFont typeface="Arial" panose="020B0604020202020204" pitchFamily="34" charset="0"/>
         <a:buChar char="•"/>
-        <a:defRPr sz="2400" kern="1200">
+        <a:defRPr sz="1600" kern="1200">
           <a:solidFill>
             <a:schemeClr val="tx1"/>
           </a:solidFill>
@@ -5896,19 +5901,19 @@
           <a:cs typeface="+mn-cs"/>
         </a:defRPr>
       </a:lvl3pPr>
-      <a:lvl4pPr marL="1097280" indent="-457200" algn="l" defTabSz="4389120" rtl="0" eaLnBrk="1" latinLnBrk="0" hangingPunct="1">
+      <a:lvl4pPr marL="731557" indent="-304815" algn="l" defTabSz="2926226" rtl="0" eaLnBrk="1" latinLnBrk="0" hangingPunct="1">
         <a:lnSpc>
           <a:spcPct val="100000"/>
         </a:lnSpc>
         <a:spcBef>
-          <a:spcPts val="1200"/>
+          <a:spcPts val="800"/>
         </a:spcBef>
         <a:buClr>
           <a:schemeClr val="accent2"/>
         </a:buClr>
         <a:buFont typeface="Arial" panose="020B0604020202020204" pitchFamily="34" charset="0"/>
         <a:buChar char="•"/>
-        <a:defRPr sz="2400" kern="1200">
+        <a:defRPr sz="1600" kern="1200">
           <a:solidFill>
             <a:schemeClr val="tx1"/>
           </a:solidFill>
@@ -5917,19 +5922,19 @@
           <a:cs typeface="+mn-cs"/>
         </a:defRPr>
       </a:lvl4pPr>
-      <a:lvl5pPr marL="1097280" indent="-457200" algn="l" defTabSz="4389120" rtl="0" eaLnBrk="1" latinLnBrk="0" hangingPunct="1">
+      <a:lvl5pPr marL="731557" indent="-304815" algn="l" defTabSz="2926226" rtl="0" eaLnBrk="1" latinLnBrk="0" hangingPunct="1">
         <a:lnSpc>
           <a:spcPct val="100000"/>
         </a:lnSpc>
         <a:spcBef>
-          <a:spcPts val="1200"/>
+          <a:spcPts val="800"/>
         </a:spcBef>
         <a:buClr>
           <a:schemeClr val="accent2"/>
         </a:buClr>
         <a:buFont typeface="Arial" panose="020B0604020202020204" pitchFamily="34" charset="0"/>
         <a:buChar char="•"/>
-        <a:defRPr sz="2400" kern="1200">
+        <a:defRPr sz="1600" kern="1200">
           <a:solidFill>
             <a:schemeClr val="tx1"/>
           </a:solidFill>
@@ -5938,19 +5943,19 @@
           <a:cs typeface="+mn-cs"/>
         </a:defRPr>
       </a:lvl5pPr>
-      <a:lvl6pPr marL="1097280" indent="-457200" algn="l" defTabSz="4389120" rtl="0" eaLnBrk="1" latinLnBrk="0" hangingPunct="1">
+      <a:lvl6pPr marL="731557" indent="-304815" algn="l" defTabSz="2926226" rtl="0" eaLnBrk="1" latinLnBrk="0" hangingPunct="1">
         <a:lnSpc>
           <a:spcPct val="100000"/>
         </a:lnSpc>
         <a:spcBef>
-          <a:spcPts val="1200"/>
+          <a:spcPts val="800"/>
         </a:spcBef>
         <a:buClr>
           <a:schemeClr val="accent2"/>
         </a:buClr>
         <a:buFont typeface="Arial" panose="020B0604020202020204" pitchFamily="34" charset="0"/>
         <a:buChar char="•"/>
-        <a:defRPr sz="2400" kern="1200">
+        <a:defRPr sz="1600" kern="1200">
           <a:solidFill>
             <a:schemeClr val="tx1"/>
           </a:solidFill>
@@ -5959,19 +5964,19 @@
           <a:cs typeface="+mn-cs"/>
         </a:defRPr>
       </a:lvl6pPr>
-      <a:lvl7pPr marL="1097280" indent="-457200" algn="l" defTabSz="4389120" rtl="0" eaLnBrk="1" latinLnBrk="0" hangingPunct="1">
+      <a:lvl7pPr marL="731557" indent="-304815" algn="l" defTabSz="2926226" rtl="0" eaLnBrk="1" latinLnBrk="0" hangingPunct="1">
         <a:lnSpc>
           <a:spcPct val="100000"/>
         </a:lnSpc>
         <a:spcBef>
-          <a:spcPts val="1200"/>
+          <a:spcPts val="800"/>
         </a:spcBef>
         <a:buClr>
           <a:schemeClr val="accent2"/>
         </a:buClr>
         <a:buFont typeface="Arial" panose="020B0604020202020204" pitchFamily="34" charset="0"/>
         <a:buChar char="•"/>
-        <a:defRPr sz="2400" kern="1200">
+        <a:defRPr sz="1600" kern="1200">
           <a:solidFill>
             <a:schemeClr val="tx1"/>
           </a:solidFill>
@@ -5980,19 +5985,19 @@
           <a:cs typeface="+mn-cs"/>
         </a:defRPr>
       </a:lvl7pPr>
-      <a:lvl8pPr marL="1097280" indent="-457200" algn="l" defTabSz="4389120" rtl="0" eaLnBrk="1" latinLnBrk="0" hangingPunct="1">
+      <a:lvl8pPr marL="731557" indent="-304815" algn="l" defTabSz="2926226" rtl="0" eaLnBrk="1" latinLnBrk="0" hangingPunct="1">
         <a:lnSpc>
           <a:spcPct val="100000"/>
         </a:lnSpc>
         <a:spcBef>
-          <a:spcPts val="1200"/>
+          <a:spcPts val="800"/>
         </a:spcBef>
         <a:buClr>
           <a:schemeClr val="accent2"/>
         </a:buClr>
         <a:buFont typeface="Arial" panose="020B0604020202020204" pitchFamily="34" charset="0"/>
         <a:buChar char="•"/>
-        <a:defRPr sz="2400" kern="1200">
+        <a:defRPr sz="1600" kern="1200">
           <a:solidFill>
             <a:schemeClr val="tx1"/>
           </a:solidFill>
@@ -6001,19 +6006,19 @@
           <a:cs typeface="+mn-cs"/>
         </a:defRPr>
       </a:lvl8pPr>
-      <a:lvl9pPr marL="1097280" indent="-457200" algn="l" defTabSz="4389120" rtl="0" eaLnBrk="1" latinLnBrk="0" hangingPunct="1">
+      <a:lvl9pPr marL="731557" indent="-304815" algn="l" defTabSz="2926226" rtl="0" eaLnBrk="1" latinLnBrk="0" hangingPunct="1">
         <a:lnSpc>
           <a:spcPct val="100000"/>
         </a:lnSpc>
         <a:spcBef>
-          <a:spcPts val="1200"/>
+          <a:spcPts val="800"/>
         </a:spcBef>
         <a:buClr>
           <a:schemeClr val="accent2"/>
         </a:buClr>
         <a:buFont typeface="Arial" panose="020B0604020202020204" pitchFamily="34" charset="0"/>
         <a:buChar char="•"/>
-        <a:defRPr sz="2400" kern="1200">
+        <a:defRPr sz="1600" kern="1200">
           <a:solidFill>
             <a:schemeClr val="tx1"/>
           </a:solidFill>
@@ -6027,8 +6032,8 @@
       <a:defPPr>
         <a:defRPr lang="en-US"/>
       </a:defPPr>
-      <a:lvl1pPr marL="0" algn="l" defTabSz="4389120" rtl="0" eaLnBrk="1" latinLnBrk="0" hangingPunct="1">
-        <a:defRPr sz="8640" kern="1200">
+      <a:lvl1pPr marL="0" algn="l" defTabSz="2926226" rtl="0" eaLnBrk="1" latinLnBrk="0" hangingPunct="1">
+        <a:defRPr sz="5760" kern="1200">
           <a:solidFill>
             <a:schemeClr val="tx1"/>
           </a:solidFill>
@@ -6037,8 +6042,8 @@
           <a:cs typeface="+mn-cs"/>
         </a:defRPr>
       </a:lvl1pPr>
-      <a:lvl2pPr marL="2194560" algn="l" defTabSz="4389120" rtl="0" eaLnBrk="1" latinLnBrk="0" hangingPunct="1">
-        <a:defRPr sz="8640" kern="1200">
+      <a:lvl2pPr marL="1463113" algn="l" defTabSz="2926226" rtl="0" eaLnBrk="1" latinLnBrk="0" hangingPunct="1">
+        <a:defRPr sz="5760" kern="1200">
           <a:solidFill>
             <a:schemeClr val="tx1"/>
           </a:solidFill>
@@ -6047,8 +6052,8 @@
           <a:cs typeface="+mn-cs"/>
         </a:defRPr>
       </a:lvl2pPr>
-      <a:lvl3pPr marL="4389120" algn="l" defTabSz="4389120" rtl="0" eaLnBrk="1" latinLnBrk="0" hangingPunct="1">
-        <a:defRPr sz="8640" kern="1200">
+      <a:lvl3pPr marL="2926226" algn="l" defTabSz="2926226" rtl="0" eaLnBrk="1" latinLnBrk="0" hangingPunct="1">
+        <a:defRPr sz="5760" kern="1200">
           <a:solidFill>
             <a:schemeClr val="tx1"/>
           </a:solidFill>
@@ -6057,8 +6062,8 @@
           <a:cs typeface="+mn-cs"/>
         </a:defRPr>
       </a:lvl3pPr>
-      <a:lvl4pPr marL="6583680" algn="l" defTabSz="4389120" rtl="0" eaLnBrk="1" latinLnBrk="0" hangingPunct="1">
-        <a:defRPr sz="8640" kern="1200">
+      <a:lvl4pPr marL="4389339" algn="l" defTabSz="2926226" rtl="0" eaLnBrk="1" latinLnBrk="0" hangingPunct="1">
+        <a:defRPr sz="5760" kern="1200">
           <a:solidFill>
             <a:schemeClr val="tx1"/>
           </a:solidFill>
@@ -6067,8 +6072,8 @@
           <a:cs typeface="+mn-cs"/>
         </a:defRPr>
       </a:lvl4pPr>
-      <a:lvl5pPr marL="8778240" algn="l" defTabSz="4389120" rtl="0" eaLnBrk="1" latinLnBrk="0" hangingPunct="1">
-        <a:defRPr sz="8640" kern="1200">
+      <a:lvl5pPr marL="5852453" algn="l" defTabSz="2926226" rtl="0" eaLnBrk="1" latinLnBrk="0" hangingPunct="1">
+        <a:defRPr sz="5760" kern="1200">
           <a:solidFill>
             <a:schemeClr val="tx1"/>
           </a:solidFill>
@@ -6077,8 +6082,8 @@
           <a:cs typeface="+mn-cs"/>
         </a:defRPr>
       </a:lvl5pPr>
-      <a:lvl6pPr marL="10972800" algn="l" defTabSz="4389120" rtl="0" eaLnBrk="1" latinLnBrk="0" hangingPunct="1">
-        <a:defRPr sz="8640" kern="1200">
+      <a:lvl6pPr marL="7315566" algn="l" defTabSz="2926226" rtl="0" eaLnBrk="1" latinLnBrk="0" hangingPunct="1">
+        <a:defRPr sz="5760" kern="1200">
           <a:solidFill>
             <a:schemeClr val="tx1"/>
           </a:solidFill>
@@ -6087,8 +6092,8 @@
           <a:cs typeface="+mn-cs"/>
         </a:defRPr>
       </a:lvl6pPr>
-      <a:lvl7pPr marL="13167360" algn="l" defTabSz="4389120" rtl="0" eaLnBrk="1" latinLnBrk="0" hangingPunct="1">
-        <a:defRPr sz="8640" kern="1200">
+      <a:lvl7pPr marL="8778679" algn="l" defTabSz="2926226" rtl="0" eaLnBrk="1" latinLnBrk="0" hangingPunct="1">
+        <a:defRPr sz="5760" kern="1200">
           <a:solidFill>
             <a:schemeClr val="tx1"/>
           </a:solidFill>
@@ -6097,8 +6102,8 @@
           <a:cs typeface="+mn-cs"/>
         </a:defRPr>
       </a:lvl7pPr>
-      <a:lvl8pPr marL="15361920" algn="l" defTabSz="4389120" rtl="0" eaLnBrk="1" latinLnBrk="0" hangingPunct="1">
-        <a:defRPr sz="8640" kern="1200">
+      <a:lvl8pPr marL="10241792" algn="l" defTabSz="2926226" rtl="0" eaLnBrk="1" latinLnBrk="0" hangingPunct="1">
+        <a:defRPr sz="5760" kern="1200">
           <a:solidFill>
             <a:schemeClr val="tx1"/>
           </a:solidFill>
@@ -6107,8 +6112,8 @@
           <a:cs typeface="+mn-cs"/>
         </a:defRPr>
       </a:lvl8pPr>
-      <a:lvl9pPr marL="17556480" algn="l" defTabSz="4389120" rtl="0" eaLnBrk="1" latinLnBrk="0" hangingPunct="1">
-        <a:defRPr sz="8640" kern="1200">
+      <a:lvl9pPr marL="11704905" algn="l" defTabSz="2926226" rtl="0" eaLnBrk="1" latinLnBrk="0" hangingPunct="1">
+        <a:defRPr sz="5760" kern="1200">
           <a:solidFill>
             <a:schemeClr val="tx1"/>
           </a:solidFill>
@@ -6122,22 +6127,22 @@
   <p:extLst mod="1">
     <p:ext uri="{27BBF7A9-308A-43DC-89C8-2F10F3537804}">
       <p15:sldGuideLst xmlns:p15="http://schemas.microsoft.com/office/powerpoint/2012/main">
-        <p15:guide id="1" orient="horz" pos="10368" userDrawn="1">
+        <p15:guide id="1" orient="horz" pos="6912" userDrawn="1">
           <p15:clr>
             <a:srgbClr val="A4A3A4"/>
           </p15:clr>
         </p15:guide>
-        <p15:guide id="2" pos="720" userDrawn="1">
+        <p15:guide id="2" pos="540" userDrawn="1">
           <p15:clr>
             <a:srgbClr val="A4A3A4"/>
           </p15:clr>
         </p15:guide>
-        <p15:guide id="3" pos="26928" userDrawn="1">
+        <p15:guide id="3" pos="20196" userDrawn="1">
           <p15:clr>
             <a:srgbClr val="A4A3A4"/>
           </p15:clr>
         </p15:guide>
-        <p15:guide id="4" pos="13824" userDrawn="1">
+        <p15:guide id="4" pos="10368" userDrawn="1">
           <p15:clr>
             <a:srgbClr val="A4A3A4"/>
           </p15:clr>
@@ -6174,7 +6179,7 @@
           <p:nvPr/>
         </p:nvPicPr>
         <p:blipFill>
-          <a:blip r:embed="rId3">
+          <a:blip r:embed="rId3" cstate="print">
             <a:extLst>
               <a:ext uri="{28A0092B-C50C-407E-A947-70E740481C1C}">
                 <a14:useLocalDpi xmlns:a14="http://schemas.microsoft.com/office/drawing/2010/main" val="0"/>
@@ -6187,8 +6192,8 @@
         </p:blipFill>
         <p:spPr>
           <a:xfrm>
-            <a:off x="1097280" y="1463040"/>
-            <a:ext cx="3365284" cy="2200847"/>
+            <a:off x="2560320" y="975361"/>
+            <a:ext cx="2243523" cy="1467231"/>
           </a:xfrm>
           <a:prstGeom prst="rect">
             <a:avLst/>
@@ -6207,7 +6212,9 @@
         </p:nvSpPr>
         <p:spPr/>
         <p:txBody>
-          <a:bodyPr/>
+          <a:bodyPr>
+            <a:normAutofit fontScale="90000"/>
+          </a:bodyPr>
           <a:lstStyle/>
           <a:p>
             <a:r>
@@ -6375,7 +6382,7 @@
           <p:nvPr/>
         </p:nvPicPr>
         <p:blipFill>
-          <a:blip r:embed="rId3">
+          <a:blip r:embed="rId3" cstate="print">
             <a:extLst>
               <a:ext uri="{28A0092B-C50C-407E-A947-70E740481C1C}">
                 <a14:useLocalDpi xmlns:a14="http://schemas.microsoft.com/office/drawing/2010/main" val="0"/>
@@ -6388,8 +6395,8 @@
         </p:blipFill>
         <p:spPr>
           <a:xfrm>
-            <a:off x="39428636" y="1463040"/>
-            <a:ext cx="3365284" cy="2200847"/>
+            <a:off x="28114557" y="975361"/>
+            <a:ext cx="2243523" cy="1467231"/>
           </a:xfrm>
           <a:prstGeom prst="rect">
             <a:avLst/>
@@ -6413,7 +6420,7 @@
           <a:p>
             <a:r>
               <a:rPr lang="en-US" dirty="0"/>
-              <a:t>abstract</a:t>
+              <a:t>MOTIVATION, PROBLEM, SOLUTION</a:t>
             </a:r>
           </a:p>
         </p:txBody>
@@ -6430,12 +6437,14 @@
         </p:nvSpPr>
         <p:spPr/>
         <p:txBody>
-          <a:bodyPr/>
+          <a:bodyPr>
+            <a:normAutofit/>
+          </a:bodyPr>
           <a:lstStyle/>
           <a:p>
             <a:r>
-              <a:rPr lang="en-US" dirty="0"/>
-              <a:t>abstract is here with no bullets and what happens when I add bullets/ </a:t>
+              <a:rPr lang="en-US" sz="2400" b="1" dirty="0"/>
+              <a:t>MOTIVATION: </a:t>
             </a:r>
           </a:p>
         </p:txBody>
@@ -6452,8 +6461,8 @@
         </p:nvSpPr>
         <p:spPr>
           <a:xfrm>
-            <a:off x="1143000" y="15032736"/>
-            <a:ext cx="12801600" cy="1219200"/>
+            <a:off x="2590800" y="10021824"/>
+            <a:ext cx="8534400" cy="812800"/>
           </a:xfrm>
         </p:spPr>
         <p:txBody>
@@ -6461,8 +6470,12 @@
           <a:lstStyle/>
           <a:p>
             <a:r>
-              <a:rPr lang="en-US" dirty="0"/>
-              <a:t>background</a:t>
+              <a:rPr lang="en-US" dirty="0" err="1"/>
+              <a:t>THOMPSon</a:t>
+            </a:r>
+            <a:r>
+              <a:rPr lang="en-US" dirty="0"/>
+              <a:t> Construction</a:t>
             </a:r>
           </a:p>
         </p:txBody>
@@ -6485,96 +6498,36 @@
             <a:pPr marL="0" indent="0">
               <a:buNone/>
             </a:pPr>
-            <a:r>
-              <a:rPr lang="en-US" b="1" dirty="0"/>
-              <a:t>Add title if necessary. Click the B button on the home tab to add bold formatting.</a:t>
-            </a:r>
-          </a:p>
-          <a:p>
-            <a:pPr lvl="1"/>
-            <a:r>
-              <a:rPr lang="en-US" dirty="0"/>
-              <a:t>Background item</a:t>
-            </a:r>
-          </a:p>
-          <a:p>
-            <a:pPr lvl="1"/>
-            <a:r>
-              <a:rPr lang="en-US" dirty="0"/>
-              <a:t>Background item</a:t>
-            </a:r>
-          </a:p>
-          <a:p>
-            <a:pPr lvl="1"/>
-            <a:r>
-              <a:rPr lang="en-US" dirty="0"/>
-              <a:t>Background item</a:t>
-            </a:r>
-          </a:p>
-          <a:p>
-            <a:endParaRPr lang="en-US" dirty="0"/>
-          </a:p>
-        </p:txBody>
-      </p:sp>
-      <p:sp>
-        <p:nvSpPr>
-          <p:cNvPr id="8" name="Text Placeholder 7"/>
-          <p:cNvSpPr>
-            <a:spLocks noGrp="1"/>
-          </p:cNvSpPr>
-          <p:nvPr>
-            <p:ph type="body" sz="quarter" idx="19"/>
-          </p:nvPr>
-        </p:nvSpPr>
-        <p:spPr/>
-        <p:txBody>
-          <a:bodyPr/>
-          <a:lstStyle/>
-          <a:p>
-            <a:r>
-              <a:rPr lang="en-US" dirty="0"/>
-              <a:t>objectives</a:t>
-            </a:r>
-          </a:p>
-        </p:txBody>
-      </p:sp>
-      <p:sp>
-        <p:nvSpPr>
-          <p:cNvPr id="13" name="Content Placeholder 12"/>
-          <p:cNvSpPr>
-            <a:spLocks noGrp="1"/>
-          </p:cNvSpPr>
-          <p:nvPr>
-            <p:ph sz="quarter" idx="26"/>
-          </p:nvPr>
-        </p:nvSpPr>
-        <p:spPr/>
-        <p:txBody>
-          <a:bodyPr/>
-          <a:lstStyle/>
-          <a:p>
-            <a:r>
-              <a:rPr lang="en-US" dirty="0"/>
-              <a:t>List objectives here</a:t>
-            </a:r>
-          </a:p>
-          <a:p>
-            <a:r>
-              <a:rPr lang="en-US" dirty="0"/>
-              <a:t>Objective 1</a:t>
-            </a:r>
-          </a:p>
-          <a:p>
-            <a:r>
-              <a:rPr lang="en-US" dirty="0"/>
-              <a:t>Objective 2</a:t>
-            </a:r>
-          </a:p>
-          <a:p>
-            <a:r>
-              <a:rPr lang="en-US" dirty="0"/>
-              <a:t>Objective 3</a:t>
-            </a:r>
+            <a:endParaRPr lang="en-US" b="1" dirty="0"/>
+          </a:p>
+          <a:p>
+            <a:r>
+              <a:rPr lang="en-US" sz="2133" b="1" dirty="0"/>
+              <a:t>INPUT: </a:t>
+            </a:r>
+            <a:r>
+              <a:rPr lang="en-US" sz="2133" dirty="0"/>
+              <a:t>A regular expression (r) over an alphabet (C)</a:t>
+            </a:r>
+          </a:p>
+          <a:p>
+            <a:r>
+              <a:rPr lang="en-US" sz="2133" b="1" dirty="0"/>
+              <a:t>OUTPUT: </a:t>
+            </a:r>
+            <a:r>
+              <a:rPr lang="en-US" sz="2133" dirty="0"/>
+              <a:t>An NFA (N) accepting a language (L(r))</a:t>
+            </a:r>
+          </a:p>
+          <a:p>
+            <a:r>
+              <a:rPr lang="en-US" sz="2133" b="1" dirty="0"/>
+              <a:t>METHOD: </a:t>
+            </a:r>
+          </a:p>
+          <a:p>
+            <a:endParaRPr lang="en-US" sz="2133" b="1" dirty="0"/>
           </a:p>
         </p:txBody>
       </p:sp>
@@ -6593,10 +6546,6 @@
           <a:bodyPr/>
           <a:lstStyle/>
           <a:p>
-            <a:r>
-              <a:rPr lang="en-US"/>
-              <a:t>methods</a:t>
-            </a:r>
             <a:endParaRPr lang="en-US" dirty="0"/>
           </a:p>
         </p:txBody>
@@ -6658,8 +6607,8 @@
           </p:nvPr>
         </p:nvGraphicFramePr>
         <p:xfrm>
-          <a:off x="15544800" y="11947525"/>
-          <a:ext cx="12801600" cy="6035617"/>
+          <a:off x="12192000" y="7965017"/>
+          <a:ext cx="8534400" cy="4023747"/>
         </p:xfrm>
         <a:graphic>
           <a:graphicData uri="http://schemas.openxmlformats.org/drawingml/2006/table">
@@ -6668,28 +6617,28 @@
                 <a:tableStyleId>{3B4B98B0-60AC-42C2-AFA5-B58CD77FA1E5}</a:tableStyleId>
               </a:tblPr>
               <a:tblGrid>
-                <a:gridCol w="3200400">
+                <a:gridCol w="2133600">
                   <a:extLst>
                     <a:ext uri="{9D8B030D-6E8A-4147-A177-3AD203B41FA5}">
                       <a16:colId xmlns:a16="http://schemas.microsoft.com/office/drawing/2014/main" val="20000"/>
                     </a:ext>
                   </a:extLst>
                 </a:gridCol>
-                <a:gridCol w="3200400">
+                <a:gridCol w="2133600">
                   <a:extLst>
                     <a:ext uri="{9D8B030D-6E8A-4147-A177-3AD203B41FA5}">
                       <a16:colId xmlns:a16="http://schemas.microsoft.com/office/drawing/2014/main" val="20001"/>
                     </a:ext>
                   </a:extLst>
                 </a:gridCol>
-                <a:gridCol w="3200400">
+                <a:gridCol w="2133600">
                   <a:extLst>
                     <a:ext uri="{9D8B030D-6E8A-4147-A177-3AD203B41FA5}">
                       <a16:colId xmlns:a16="http://schemas.microsoft.com/office/drawing/2014/main" val="20002"/>
                     </a:ext>
                   </a:extLst>
                 </a:gridCol>
-                <a:gridCol w="3200400">
+                <a:gridCol w="2133600">
                   <a:extLst>
                     <a:ext uri="{9D8B030D-6E8A-4147-A177-3AD203B41FA5}">
                       <a16:colId xmlns:a16="http://schemas.microsoft.com/office/drawing/2014/main" val="20003"/>
@@ -6697,16 +6646,16 @@
                   </a:extLst>
                 </a:gridCol>
               </a:tblGrid>
-              <a:tr h="862231">
+              <a:tr h="574821">
                 <a:tc>
                   <a:txBody>
                     <a:bodyPr/>
                     <a:lstStyle/>
                     <a:p>
-                      <a:endParaRPr lang="en-US" sz="2800" dirty="0"/>
+                      <a:endParaRPr lang="en-US" sz="1900" dirty="0"/>
                     </a:p>
                   </a:txBody>
-                  <a:tcPr anchor="ctr"/>
+                  <a:tcPr marL="60960" marR="60960" marT="30480" marB="30480" anchor="ctr"/>
                 </a:tc>
                 <a:tc>
                   <a:txBody>
@@ -6715,12 +6664,12 @@
                     <a:p>
                       <a:pPr algn="ctr"/>
                       <a:r>
-                        <a:rPr lang="en-US" sz="2800" dirty="0"/>
+                        <a:rPr lang="en-US" sz="1900" dirty="0"/>
                         <a:t>Heading</a:t>
                       </a:r>
                     </a:p>
                   </a:txBody>
-                  <a:tcPr anchor="ctr"/>
+                  <a:tcPr marL="60960" marR="60960" marT="30480" marB="30480" anchor="ctr"/>
                 </a:tc>
                 <a:tc>
                   <a:txBody>
@@ -6729,12 +6678,12 @@
                     <a:p>
                       <a:pPr algn="ctr"/>
                       <a:r>
-                        <a:rPr lang="en-US" sz="2800" dirty="0"/>
+                        <a:rPr lang="en-US" sz="1900" dirty="0"/>
                         <a:t>Heading</a:t>
                       </a:r>
                     </a:p>
                   </a:txBody>
-                  <a:tcPr anchor="ctr"/>
+                  <a:tcPr marL="60960" marR="60960" marT="30480" marB="30480" anchor="ctr"/>
                 </a:tc>
                 <a:tc>
                   <a:txBody>
@@ -6743,12 +6692,12 @@
                     <a:p>
                       <a:pPr algn="ctr"/>
                       <a:r>
-                        <a:rPr lang="en-US" sz="2800" dirty="0"/>
+                        <a:rPr lang="en-US" sz="1900" dirty="0"/>
                         <a:t>Heading</a:t>
                       </a:r>
                     </a:p>
                   </a:txBody>
-                  <a:tcPr anchor="ctr"/>
+                  <a:tcPr marL="60960" marR="60960" marT="30480" marB="30480" anchor="ctr"/>
                 </a:tc>
                 <a:extLst>
                   <a:ext uri="{0D108BD9-81ED-4DB2-BD59-A6C34878D82A}">
@@ -6756,19 +6705,19 @@
                   </a:ext>
                 </a:extLst>
               </a:tr>
-              <a:tr h="862231">
+              <a:tr h="574821">
                 <a:tc>
                   <a:txBody>
                     <a:bodyPr/>
                     <a:lstStyle/>
                     <a:p>
                       <a:r>
-                        <a:rPr lang="en-US" sz="2800" dirty="0"/>
+                        <a:rPr lang="en-US" sz="1900" dirty="0"/>
                         <a:t>Item</a:t>
                       </a:r>
                     </a:p>
                   </a:txBody>
-                  <a:tcPr anchor="ctr"/>
+                  <a:tcPr marL="60960" marR="60960" marT="30480" marB="30480" anchor="ctr"/>
                 </a:tc>
                 <a:tc>
                   <a:txBody>
@@ -6777,12 +6726,12 @@
                     <a:p>
                       <a:pPr algn="ctr"/>
                       <a:r>
-                        <a:rPr lang="en-US" sz="2800" dirty="0"/>
+                        <a:rPr lang="en-US" sz="1900" dirty="0"/>
                         <a:t>122</a:t>
                       </a:r>
                     </a:p>
                   </a:txBody>
-                  <a:tcPr anchor="ctr"/>
+                  <a:tcPr marL="60960" marR="60960" marT="30480" marB="30480" anchor="ctr"/>
                 </a:tc>
                 <a:tc>
                   <a:txBody>
@@ -6791,12 +6740,12 @@
                     <a:p>
                       <a:pPr algn="ctr"/>
                       <a:r>
-                        <a:rPr lang="en-US" sz="2800" dirty="0"/>
+                        <a:rPr lang="en-US" sz="1900" dirty="0"/>
                         <a:t>233</a:t>
                       </a:r>
                     </a:p>
                   </a:txBody>
-                  <a:tcPr anchor="ctr"/>
+                  <a:tcPr marL="60960" marR="60960" marT="30480" marB="30480" anchor="ctr"/>
                 </a:tc>
                 <a:tc>
                   <a:txBody>
@@ -6805,12 +6754,12 @@
                     <a:p>
                       <a:pPr algn="ctr"/>
                       <a:r>
-                        <a:rPr lang="en-US" sz="2800" dirty="0"/>
+                        <a:rPr lang="en-US" sz="1900" dirty="0"/>
                         <a:t>345</a:t>
                       </a:r>
                     </a:p>
                   </a:txBody>
-                  <a:tcPr anchor="ctr"/>
+                  <a:tcPr marL="60960" marR="60960" marT="30480" marB="30480" anchor="ctr"/>
                 </a:tc>
                 <a:extLst>
                   <a:ext uri="{0D108BD9-81ED-4DB2-BD59-A6C34878D82A}">
@@ -6818,19 +6767,19 @@
                   </a:ext>
                 </a:extLst>
               </a:tr>
-              <a:tr h="862231">
+              <a:tr h="574821">
                 <a:tc>
                   <a:txBody>
                     <a:bodyPr/>
                     <a:lstStyle/>
                     <a:p>
                       <a:r>
-                        <a:rPr lang="en-US" sz="2800" dirty="0"/>
+                        <a:rPr lang="en-US" sz="1900" dirty="0"/>
                         <a:t>Item</a:t>
                       </a:r>
                     </a:p>
                   </a:txBody>
-                  <a:tcPr anchor="ctr"/>
+                  <a:tcPr marL="60960" marR="60960" marT="30480" marB="30480" anchor="ctr"/>
                 </a:tc>
                 <a:tc>
                   <a:txBody>
@@ -6839,12 +6788,12 @@
                     <a:p>
                       <a:pPr algn="ctr"/>
                       <a:r>
-                        <a:rPr lang="en-US" sz="2800" dirty="0"/>
+                        <a:rPr lang="en-US" sz="1900" dirty="0"/>
                         <a:t>759</a:t>
                       </a:r>
                     </a:p>
                   </a:txBody>
-                  <a:tcPr anchor="ctr"/>
+                  <a:tcPr marL="60960" marR="60960" marT="30480" marB="30480" anchor="ctr"/>
                 </a:tc>
                 <a:tc>
                   <a:txBody>
@@ -6853,12 +6802,12 @@
                     <a:p>
                       <a:pPr algn="ctr"/>
                       <a:r>
-                        <a:rPr lang="en-US" sz="2800" dirty="0"/>
+                        <a:rPr lang="en-US" sz="1900" dirty="0"/>
                         <a:t>856</a:t>
                       </a:r>
                     </a:p>
                   </a:txBody>
-                  <a:tcPr anchor="ctr"/>
+                  <a:tcPr marL="60960" marR="60960" marT="30480" marB="30480" anchor="ctr"/>
                 </a:tc>
                 <a:tc>
                   <a:txBody>
@@ -6867,12 +6816,12 @@
                     <a:p>
                       <a:pPr algn="ctr"/>
                       <a:r>
-                        <a:rPr lang="en-US" sz="2800" dirty="0"/>
+                        <a:rPr lang="en-US" sz="1900" dirty="0"/>
                         <a:t>290</a:t>
                       </a:r>
                     </a:p>
                   </a:txBody>
-                  <a:tcPr anchor="ctr"/>
+                  <a:tcPr marL="60960" marR="60960" marT="30480" marB="30480" anchor="ctr"/>
                 </a:tc>
                 <a:extLst>
                   <a:ext uri="{0D108BD9-81ED-4DB2-BD59-A6C34878D82A}">
@@ -6880,19 +6829,19 @@
                   </a:ext>
                 </a:extLst>
               </a:tr>
-              <a:tr h="862231">
+              <a:tr h="574821">
                 <a:tc>
                   <a:txBody>
                     <a:bodyPr/>
                     <a:lstStyle/>
                     <a:p>
                       <a:r>
-                        <a:rPr lang="en-US" sz="2800" dirty="0"/>
+                        <a:rPr lang="en-US" sz="1900" dirty="0"/>
                         <a:t>Item</a:t>
                       </a:r>
                     </a:p>
                   </a:txBody>
-                  <a:tcPr anchor="ctr"/>
+                  <a:tcPr marL="60960" marR="60960" marT="30480" marB="30480" anchor="ctr"/>
                 </a:tc>
                 <a:tc>
                   <a:txBody>
@@ -6901,12 +6850,12 @@
                     <a:p>
                       <a:pPr algn="ctr"/>
                       <a:r>
-                        <a:rPr lang="en-US" sz="2800" dirty="0"/>
+                        <a:rPr lang="en-US" sz="1900" dirty="0"/>
                         <a:t>228</a:t>
                       </a:r>
                     </a:p>
                   </a:txBody>
-                  <a:tcPr anchor="ctr"/>
+                  <a:tcPr marL="60960" marR="60960" marT="30480" marB="30480" anchor="ctr"/>
                 </a:tc>
                 <a:tc>
                   <a:txBody>
@@ -6915,12 +6864,12 @@
                     <a:p>
                       <a:pPr algn="ctr"/>
                       <a:r>
-                        <a:rPr lang="en-US" sz="2800" dirty="0"/>
+                        <a:rPr lang="en-US" sz="1900" dirty="0"/>
                         <a:t>134</a:t>
                       </a:r>
                     </a:p>
                   </a:txBody>
-                  <a:tcPr anchor="ctr"/>
+                  <a:tcPr marL="60960" marR="60960" marT="30480" marB="30480" anchor="ctr"/>
                 </a:tc>
                 <a:tc>
                   <a:txBody>
@@ -6929,12 +6878,12 @@
                     <a:p>
                       <a:pPr algn="ctr"/>
                       <a:r>
-                        <a:rPr lang="en-US" sz="2800" dirty="0"/>
+                        <a:rPr lang="en-US" sz="1900" dirty="0"/>
                         <a:t>238</a:t>
                       </a:r>
                     </a:p>
                   </a:txBody>
-                  <a:tcPr anchor="ctr"/>
+                  <a:tcPr marL="60960" marR="60960" marT="30480" marB="30480" anchor="ctr"/>
                 </a:tc>
                 <a:extLst>
                   <a:ext uri="{0D108BD9-81ED-4DB2-BD59-A6C34878D82A}">
@@ -6942,19 +6891,19 @@
                   </a:ext>
                 </a:extLst>
               </a:tr>
-              <a:tr h="862231">
+              <a:tr h="574821">
                 <a:tc>
                   <a:txBody>
                     <a:bodyPr/>
                     <a:lstStyle/>
                     <a:p>
                       <a:r>
-                        <a:rPr lang="en-US" sz="2800" dirty="0"/>
+                        <a:rPr lang="en-US" sz="1900" dirty="0"/>
                         <a:t>Item</a:t>
                       </a:r>
                     </a:p>
                   </a:txBody>
-                  <a:tcPr anchor="ctr"/>
+                  <a:tcPr marL="60960" marR="60960" marT="30480" marB="30480" anchor="ctr"/>
                 </a:tc>
                 <a:tc>
                   <a:txBody>
@@ -6963,12 +6912,12 @@
                     <a:p>
                       <a:pPr algn="ctr"/>
                       <a:r>
-                        <a:rPr lang="en-US" sz="2800" dirty="0"/>
+                        <a:rPr lang="en-US" sz="1900" dirty="0"/>
                         <a:t>954</a:t>
                       </a:r>
                     </a:p>
                   </a:txBody>
-                  <a:tcPr anchor="ctr"/>
+                  <a:tcPr marL="60960" marR="60960" marT="30480" marB="30480" anchor="ctr"/>
                 </a:tc>
                 <a:tc>
                   <a:txBody>
@@ -6977,12 +6926,12 @@
                     <a:p>
                       <a:pPr algn="ctr"/>
                       <a:r>
-                        <a:rPr lang="en-US" sz="2800" dirty="0"/>
+                        <a:rPr lang="en-US" sz="1900" dirty="0"/>
                         <a:t>875</a:t>
                       </a:r>
                     </a:p>
                   </a:txBody>
-                  <a:tcPr anchor="ctr"/>
+                  <a:tcPr marL="60960" marR="60960" marT="30480" marB="30480" anchor="ctr"/>
                 </a:tc>
                 <a:tc>
                   <a:txBody>
@@ -6991,12 +6940,12 @@
                     <a:p>
                       <a:pPr algn="ctr"/>
                       <a:r>
-                        <a:rPr lang="en-US" sz="2800" dirty="0"/>
+                        <a:rPr lang="en-US" sz="1900" dirty="0"/>
                         <a:t>976</a:t>
                       </a:r>
                     </a:p>
                   </a:txBody>
-                  <a:tcPr anchor="ctr"/>
+                  <a:tcPr marL="60960" marR="60960" marT="30480" marB="30480" anchor="ctr"/>
                 </a:tc>
                 <a:extLst>
                   <a:ext uri="{0D108BD9-81ED-4DB2-BD59-A6C34878D82A}">
@@ -7004,19 +6953,19 @@
                   </a:ext>
                 </a:extLst>
               </a:tr>
-              <a:tr h="862231">
+              <a:tr h="574821">
                 <a:tc>
                   <a:txBody>
                     <a:bodyPr/>
                     <a:lstStyle/>
                     <a:p>
                       <a:r>
-                        <a:rPr lang="en-US" sz="2800" dirty="0"/>
+                        <a:rPr lang="en-US" sz="1900" dirty="0"/>
                         <a:t>Item</a:t>
                       </a:r>
                     </a:p>
                   </a:txBody>
-                  <a:tcPr anchor="ctr"/>
+                  <a:tcPr marL="60960" marR="60960" marT="30480" marB="30480" anchor="ctr"/>
                 </a:tc>
                 <a:tc>
                   <a:txBody>
@@ -7025,12 +6974,12 @@
                     <a:p>
                       <a:pPr algn="ctr"/>
                       <a:r>
-                        <a:rPr lang="en-US" sz="2800" dirty="0"/>
+                        <a:rPr lang="en-US" sz="1900" dirty="0"/>
                         <a:t>324</a:t>
                       </a:r>
                     </a:p>
                   </a:txBody>
-                  <a:tcPr anchor="ctr"/>
+                  <a:tcPr marL="60960" marR="60960" marT="30480" marB="30480" anchor="ctr"/>
                 </a:tc>
                 <a:tc>
                   <a:txBody>
@@ -7039,12 +6988,12 @@
                     <a:p>
                       <a:pPr algn="ctr"/>
                       <a:r>
-                        <a:rPr lang="en-US" sz="2800" dirty="0"/>
+                        <a:rPr lang="en-US" sz="1900" dirty="0"/>
                         <a:t>325</a:t>
                       </a:r>
                     </a:p>
                   </a:txBody>
-                  <a:tcPr anchor="ctr"/>
+                  <a:tcPr marL="60960" marR="60960" marT="30480" marB="30480" anchor="ctr"/>
                 </a:tc>
                 <a:tc>
                   <a:txBody>
@@ -7053,12 +7002,12 @@
                     <a:p>
                       <a:pPr algn="ctr"/>
                       <a:r>
-                        <a:rPr lang="en-US" sz="2800" dirty="0"/>
+                        <a:rPr lang="en-US" sz="1900" dirty="0"/>
                         <a:t>301</a:t>
                       </a:r>
                     </a:p>
                   </a:txBody>
-                  <a:tcPr anchor="ctr"/>
+                  <a:tcPr marL="60960" marR="60960" marT="30480" marB="30480" anchor="ctr"/>
                 </a:tc>
                 <a:extLst>
                   <a:ext uri="{0D108BD9-81ED-4DB2-BD59-A6C34878D82A}">
@@ -7066,19 +7015,19 @@
                   </a:ext>
                 </a:extLst>
               </a:tr>
-              <a:tr h="862231">
+              <a:tr h="574821">
                 <a:tc>
                   <a:txBody>
                     <a:bodyPr/>
                     <a:lstStyle/>
                     <a:p>
                       <a:r>
-                        <a:rPr lang="en-US" sz="2800" dirty="0"/>
+                        <a:rPr lang="en-US" sz="1900" dirty="0"/>
                         <a:t>Item</a:t>
                       </a:r>
                     </a:p>
                   </a:txBody>
-                  <a:tcPr anchor="ctr"/>
+                  <a:tcPr marL="60960" marR="60960" marT="30480" marB="30480" anchor="ctr"/>
                 </a:tc>
                 <a:tc>
                   <a:txBody>
@@ -7087,12 +7036,12 @@
                     <a:p>
                       <a:pPr algn="ctr"/>
                       <a:r>
-                        <a:rPr lang="en-US" sz="2800" dirty="0"/>
+                        <a:rPr lang="en-US" sz="1900" dirty="0"/>
                         <a:t>199</a:t>
                       </a:r>
                     </a:p>
                   </a:txBody>
-                  <a:tcPr anchor="ctr"/>
+                  <a:tcPr marL="60960" marR="60960" marT="30480" marB="30480" anchor="ctr"/>
                 </a:tc>
                 <a:tc>
                   <a:txBody>
@@ -7101,12 +7050,12 @@
                     <a:p>
                       <a:pPr algn="ctr"/>
                       <a:r>
-                        <a:rPr lang="en-US" sz="2800" dirty="0"/>
+                        <a:rPr lang="en-US" sz="1900" dirty="0"/>
                         <a:t>137</a:t>
                       </a:r>
                     </a:p>
                   </a:txBody>
-                  <a:tcPr anchor="ctr"/>
+                  <a:tcPr marL="60960" marR="60960" marT="30480" marB="30480" anchor="ctr"/>
                 </a:tc>
                 <a:tc>
                   <a:txBody>
@@ -7115,12 +7064,12 @@
                     <a:p>
                       <a:pPr algn="ctr"/>
                       <a:r>
-                        <a:rPr lang="en-US" sz="2800" dirty="0"/>
+                        <a:rPr lang="en-US" sz="1900" dirty="0"/>
                         <a:t>186</a:t>
                       </a:r>
                     </a:p>
                   </a:txBody>
-                  <a:tcPr anchor="ctr"/>
+                  <a:tcPr marL="60960" marR="60960" marT="30480" marB="30480" anchor="ctr"/>
                 </a:tc>
                 <a:extLst>
                   <a:ext uri="{0D108BD9-81ED-4DB2-BD59-A6C34878D82A}">
@@ -7154,8 +7103,8 @@
         </p:blipFill>
         <p:spPr>
           <a:xfrm>
-            <a:off x="15544800" y="18897600"/>
-            <a:ext cx="2834641" cy="3968496"/>
+            <a:off x="12192000" y="12598400"/>
+            <a:ext cx="1889761" cy="2645664"/>
           </a:xfrm>
           <a:prstGeom prst="rect">
             <a:avLst/>
@@ -7184,8 +7133,8 @@
         </p:blipFill>
         <p:spPr>
           <a:xfrm>
-            <a:off x="18784949" y="18897600"/>
-            <a:ext cx="3604717" cy="3968496"/>
+            <a:off x="14352100" y="12598400"/>
+            <a:ext cx="2403145" cy="2645664"/>
           </a:xfrm>
           <a:prstGeom prst="rect">
             <a:avLst/>
@@ -7201,7 +7150,7 @@
           <p:nvPr/>
         </p:nvPicPr>
         <p:blipFill>
-          <a:blip r:embed="rId6">
+          <a:blip r:embed="rId6" cstate="print">
             <a:extLst>
               <a:ext uri="{28A0092B-C50C-407E-A947-70E740481C1C}">
                 <a14:useLocalDpi xmlns:a14="http://schemas.microsoft.com/office/drawing/2010/main" val="0"/>
@@ -7214,8 +7163,8 @@
         </p:blipFill>
         <p:spPr>
           <a:xfrm>
-            <a:off x="22795174" y="18897600"/>
-            <a:ext cx="5555894" cy="3968496"/>
+            <a:off x="17025583" y="12598400"/>
+            <a:ext cx="3703929" cy="2645664"/>
           </a:xfrm>
           <a:prstGeom prst="rect">
             <a:avLst/>
@@ -7342,8 +7291,8 @@
           </p:nvPr>
         </p:nvGraphicFramePr>
         <p:xfrm>
-          <a:off x="29900563" y="7070725"/>
-          <a:ext cx="12801600" cy="7315200"/>
+          <a:off x="21762509" y="4713817"/>
+          <a:ext cx="8534400" cy="4876800"/>
         </p:xfrm>
         <a:graphic>
           <a:graphicData uri="http://schemas.openxmlformats.org/drawingml/2006/chart">
@@ -7367,8 +7316,8 @@
           </p:nvPr>
         </p:nvGraphicFramePr>
         <p:xfrm>
-          <a:off x="29900563" y="15836900"/>
-          <a:ext cx="12801600" cy="7315200"/>
+          <a:off x="21762509" y="10557933"/>
+          <a:ext cx="8534400" cy="4876800"/>
         </p:xfrm>
         <a:graphic>
           <a:graphicData uri="http://schemas.openxmlformats.org/drawingml/2006/chart">
@@ -7434,6 +7383,36 @@
           </a:p>
         </p:txBody>
       </p:sp>
+      <p:pic>
+        <p:nvPicPr>
+          <p:cNvPr id="19" name="Picture 18">
+            <a:extLst>
+              <a:ext uri="{FF2B5EF4-FFF2-40B4-BE49-F238E27FC236}">
+                <a16:creationId xmlns:a16="http://schemas.microsoft.com/office/drawing/2014/main" id="{8E579DEE-5A41-447C-99A9-8BF5660D8169}"/>
+              </a:ext>
+            </a:extLst>
+          </p:cNvPr>
+          <p:cNvPicPr>
+            <a:picLocks noChangeAspect="1"/>
+          </p:cNvPicPr>
+          <p:nvPr/>
+        </p:nvPicPr>
+        <p:blipFill>
+          <a:blip r:embed="rId9"/>
+          <a:stretch>
+            <a:fillRect/>
+          </a:stretch>
+        </p:blipFill>
+        <p:spPr>
+          <a:xfrm>
+            <a:off x="3991898" y="12758208"/>
+            <a:ext cx="6126569" cy="6058777"/>
+          </a:xfrm>
+          <a:prstGeom prst="rect">
+            <a:avLst/>
+          </a:prstGeom>
+        </p:spPr>
+      </p:pic>
     </p:spTree>
     <p:extLst>
       <p:ext uri="{BB962C8B-B14F-4D97-AF65-F5344CB8AC3E}">

</xml_diff>

<commit_message>
intro, background study partially done
</commit_message>
<xml_diff>
--- a/poster/research-poster-template-2.pptx
+++ b/poster/research-poster-template-2.pptx
@@ -6170,36 +6170,6 @@
           <a:chExt cx="0" cy="0"/>
         </a:xfrm>
       </p:grpSpPr>
-      <p:pic>
-        <p:nvPicPr>
-          <p:cNvPr id="35" name="Picture 34" descr="Logo" title="Sample Picture"/>
-          <p:cNvPicPr>
-            <a:picLocks noChangeAspect="1"/>
-          </p:cNvPicPr>
-          <p:nvPr/>
-        </p:nvPicPr>
-        <p:blipFill>
-          <a:blip r:embed="rId3" cstate="print">
-            <a:extLst>
-              <a:ext uri="{28A0092B-C50C-407E-A947-70E740481C1C}">
-                <a14:useLocalDpi xmlns:a14="http://schemas.microsoft.com/office/drawing/2010/main" val="0"/>
-              </a:ext>
-            </a:extLst>
-          </a:blip>
-          <a:stretch>
-            <a:fillRect/>
-          </a:stretch>
-        </p:blipFill>
-        <p:spPr>
-          <a:xfrm>
-            <a:off x="2560320" y="975361"/>
-            <a:ext cx="2243523" cy="1467231"/>
-          </a:xfrm>
-          <a:prstGeom prst="rect">
-            <a:avLst/>
-          </a:prstGeom>
-        </p:spPr>
-      </p:pic>
       <p:sp>
         <p:nvSpPr>
           <p:cNvPr id="4" name="Title 3"/>
@@ -6217,93 +6187,17 @@
           </a:bodyPr>
           <a:lstStyle/>
           <a:p>
-            <a:r>
-              <a:rPr lang="en-US" dirty="0"/>
-              <a:t>[Poster Title] </a:t>
-            </a:r>
-            <a:r>
-              <a:rPr lang="en-US" dirty="0" err="1"/>
-              <a:t>Lorem</a:t>
-            </a:r>
-            <a:r>
-              <a:rPr lang="en-US" dirty="0"/>
-              <a:t> </a:t>
-            </a:r>
-            <a:r>
-              <a:rPr lang="en-US" dirty="0" err="1"/>
-              <a:t>ipsum</a:t>
-            </a:r>
-            <a:r>
-              <a:rPr lang="en-US" dirty="0"/>
-              <a:t> dolor sit </a:t>
-            </a:r>
-            <a:r>
-              <a:rPr lang="en-US" dirty="0" err="1"/>
-              <a:t>amet</a:t>
-            </a:r>
-            <a:r>
-              <a:rPr lang="en-US" dirty="0"/>
-              <a:t>, </a:t>
-            </a:r>
-            <a:r>
-              <a:rPr lang="en-US" dirty="0" err="1"/>
-              <a:t>consectetuer</a:t>
-            </a:r>
-            <a:r>
-              <a:rPr lang="en-US" dirty="0"/>
-              <a:t> </a:t>
-            </a:r>
-            <a:r>
-              <a:rPr lang="en-US" dirty="0" err="1"/>
-              <a:t>adipiscing</a:t>
-            </a:r>
-            <a:r>
-              <a:rPr lang="en-US" dirty="0"/>
-              <a:t> </a:t>
-            </a:r>
-            <a:r>
-              <a:rPr lang="en-US" dirty="0" err="1"/>
-              <a:t>elit</a:t>
-            </a:r>
-            <a:r>
-              <a:rPr lang="en-US" dirty="0"/>
-              <a:t> </a:t>
-            </a:r>
-            <a:r>
-              <a:rPr lang="en-US" dirty="0" err="1"/>
-              <a:t>maecenas</a:t>
-            </a:r>
-            <a:r>
-              <a:rPr lang="en-US" dirty="0"/>
-              <a:t> </a:t>
-            </a:r>
-            <a:r>
-              <a:rPr lang="en-US" dirty="0" err="1"/>
-              <a:t>porttitor</a:t>
-            </a:r>
-            <a:r>
-              <a:rPr lang="en-US" dirty="0"/>
-              <a:t> </a:t>
-            </a:r>
-            <a:r>
-              <a:rPr lang="en-US" dirty="0" err="1"/>
-              <a:t>congue</a:t>
-            </a:r>
-            <a:r>
-              <a:rPr lang="en-US" dirty="0"/>
-              <a:t> </a:t>
-            </a:r>
-            <a:r>
-              <a:rPr lang="en-US" dirty="0" err="1"/>
-              <a:t>massa</a:t>
-            </a:r>
-            <a:r>
-              <a:rPr lang="en-US" dirty="0"/>
-              <a:t> </a:t>
-            </a:r>
-            <a:r>
-              <a:rPr lang="en-US" dirty="0" err="1"/>
-              <a:t>fusce</a:t>
+            <a:pPr algn="ctr"/>
+            <a:r>
+              <a:rPr lang="en-CA" b="0" dirty="0"/>
+              <a:t>Approximate Regular Expressions: A Comparison of Exact and</a:t>
+            </a:r>
+            <a:br>
+              <a:rPr lang="en-CA" b="0" dirty="0"/>
+            </a:br>
+            <a:r>
+              <a:rPr lang="en-US" b="0" dirty="0"/>
+              <a:t>Approximate Matching Algorithms</a:t>
             </a:r>
             <a:endParaRPr lang="en-US" dirty="0"/>
           </a:p>
@@ -6324,85 +6218,71 @@
           <a:bodyPr/>
           <a:lstStyle/>
           <a:p>
-            <a:r>
-              <a:rPr lang="en-US" dirty="0"/>
-              <a:t>[Replace the following names and titles with those of the actual contributors: </a:t>
+            <a:pPr algn="ctr"/>
+            <a:r>
+              <a:rPr lang="en-US" dirty="0"/>
+              <a:t>Umme Salma </a:t>
             </a:r>
             <a:r>
               <a:rPr lang="en-US" dirty="0" err="1"/>
-              <a:t>Dorena</a:t>
-            </a:r>
-            <a:r>
-              <a:rPr lang="en-US" dirty="0"/>
-              <a:t> </a:t>
-            </a:r>
-            <a:r>
-              <a:rPr lang="en-US" dirty="0" err="1"/>
-              <a:t>Paschke</a:t>
-            </a:r>
-            <a:r>
-              <a:rPr lang="en-US" dirty="0"/>
-              <a:t>, PhD1; David Alexander, PhD2;  Jeff Hay, RN, BSN, MHA3, and </a:t>
-            </a:r>
-            <a:r>
-              <a:rPr lang="en-US" dirty="0" err="1"/>
-              <a:t>Pilar</a:t>
-            </a:r>
-            <a:r>
-              <a:rPr lang="en-US" dirty="0"/>
-              <a:t> </a:t>
-            </a:r>
-            <a:r>
-              <a:rPr lang="en-US" dirty="0" err="1"/>
-              <a:t>Pinilla</a:t>
-            </a:r>
-            <a:r>
-              <a:rPr lang="en-US" dirty="0"/>
-              <a:t>, MD4</a:t>
-            </a:r>
-            <a:br>
-              <a:rPr lang="en-US" dirty="0"/>
-            </a:br>
-            <a:r>
-              <a:rPr lang="en-US" dirty="0"/>
-              <a:t>1[Add affiliation for first contributor], 2[Add affiliation for second contributor], 3[Add affiliation for third contributor], 4[Add affiliation for fourth contributor]</a:t>
-            </a:r>
-          </a:p>
-          <a:p>
-            <a:endParaRPr lang="en-US" dirty="0"/>
+              <a:t>Gadriwala</a:t>
+            </a:r>
+            <a:r>
+              <a:rPr lang="en-US" dirty="0"/>
+              <a:t>, Tasnim Noshin, Rumsha Siddiqui </a:t>
+            </a:r>
+            <a:r>
+              <a:rPr lang="en-CA" dirty="0"/>
+              <a:t>{</a:t>
+            </a:r>
+            <a:r>
+              <a:rPr lang="en-CA" dirty="0" err="1"/>
+              <a:t>gadriwau</a:t>
+            </a:r>
+            <a:r>
+              <a:rPr lang="en-CA" dirty="0"/>
+              <a:t>, </a:t>
+            </a:r>
+            <a:r>
+              <a:rPr lang="en-CA" dirty="0" err="1"/>
+              <a:t>noshint</a:t>
+            </a:r>
+            <a:r>
+              <a:rPr lang="en-CA" dirty="0"/>
+              <a:t>, </a:t>
+            </a:r>
+            <a:r>
+              <a:rPr lang="en-CA" dirty="0" err="1"/>
+              <a:t>siddiqur</a:t>
+            </a:r>
+            <a:r>
+              <a:rPr lang="en-CA" dirty="0"/>
+              <a:t>}@mcmaster.ca</a:t>
+            </a:r>
+          </a:p>
+          <a:p>
+            <a:pPr algn="ctr"/>
+            <a:r>
+              <a:rPr lang="en-CA" dirty="0"/>
+              <a:t>Department of Computing and Software, McMaster University</a:t>
+            </a:r>
+          </a:p>
+          <a:p>
+            <a:pPr algn="ctr"/>
+            <a:r>
+              <a:rPr lang="en-CA" dirty="0"/>
+              <a:t>1280 Main St. W, Hamilton, Ontario, Canada L8S 4L8</a:t>
+            </a:r>
+          </a:p>
+          <a:p>
+            <a:pPr algn="ctr"/>
+            <a:r>
+              <a:rPr lang="en-US" dirty="0"/>
+              <a:t>April 2019</a:t>
+            </a:r>
           </a:p>
         </p:txBody>
       </p:sp>
-      <p:pic>
-        <p:nvPicPr>
-          <p:cNvPr id="36" name="Picture 35" descr="Logo" title="Sample Picture"/>
-          <p:cNvPicPr>
-            <a:picLocks noChangeAspect="1"/>
-          </p:cNvPicPr>
-          <p:nvPr/>
-        </p:nvPicPr>
-        <p:blipFill>
-          <a:blip r:embed="rId3" cstate="print">
-            <a:extLst>
-              <a:ext uri="{28A0092B-C50C-407E-A947-70E740481C1C}">
-                <a14:useLocalDpi xmlns:a14="http://schemas.microsoft.com/office/drawing/2010/main" val="0"/>
-              </a:ext>
-            </a:extLst>
-          </a:blip>
-          <a:stretch>
-            <a:fillRect/>
-          </a:stretch>
-        </p:blipFill>
-        <p:spPr>
-          <a:xfrm>
-            <a:off x="28114557" y="975361"/>
-            <a:ext cx="2243523" cy="1467231"/>
-          </a:xfrm>
-          <a:prstGeom prst="rect">
-            <a:avLst/>
-          </a:prstGeom>
-        </p:spPr>
-      </p:pic>
       <p:sp>
         <p:nvSpPr>
           <p:cNvPr id="5" name="Text Placeholder 4"/>
@@ -6435,7 +6315,12 @@
             <p:ph sz="quarter" idx="24"/>
           </p:nvPr>
         </p:nvSpPr>
-        <p:spPr/>
+        <p:spPr>
+          <a:xfrm>
+            <a:off x="857250" y="4714240"/>
+            <a:ext cx="9601200" cy="7133844"/>
+          </a:xfrm>
+        </p:spPr>
         <p:txBody>
           <a:bodyPr>
             <a:normAutofit/>
@@ -6446,6 +6331,37 @@
               <a:rPr lang="en-US" sz="2400" b="1" dirty="0"/>
               <a:t>MOTIVATION: </a:t>
             </a:r>
+            <a:r>
+              <a:rPr lang="en-CA" sz="2400" dirty="0"/>
+              <a:t>In bioinformatics, approximate matching is vital for comparing and contrasting DNA and protein sequences. The length of sequences involved in these applications reach billions. Thus, efficient string matching algorithms are needed to preserve time and cost of resources.</a:t>
+            </a:r>
+          </a:p>
+          <a:p>
+            <a:endParaRPr lang="en-CA" sz="2400" dirty="0"/>
+          </a:p>
+          <a:p>
+            <a:r>
+              <a:rPr lang="en-CA" sz="2400" b="1" dirty="0"/>
+              <a:t>PROBLEM: </a:t>
+            </a:r>
+            <a:r>
+              <a:rPr lang="en-CA" sz="2400" dirty="0"/>
+              <a:t>This project explores whether or not an implementation of exact matching can be replaced with one of approximate matching, where the error value for an exact match request would be set to zero.</a:t>
+            </a:r>
+          </a:p>
+          <a:p>
+            <a:endParaRPr lang="en-CA" sz="2400" dirty="0"/>
+          </a:p>
+          <a:p>
+            <a:r>
+              <a:rPr lang="en-CA" sz="2400" b="1" dirty="0"/>
+              <a:t>SOLUTION: </a:t>
+            </a:r>
+            <a:r>
+              <a:rPr lang="en-CA" sz="2400" dirty="0"/>
+              <a:t>A Python implementation of Thompson's exact matching algorithm is compared with that of Myers and Miller's approximate matching algorithm built on Thompson’s construction. Matches between string and regular expressions of various lengths are used for testing. The testing methodology compares the time each algorithm takes for the same samples. </a:t>
+            </a:r>
+            <a:endParaRPr lang="en-US" sz="2400" b="1" dirty="0"/>
           </a:p>
         </p:txBody>
       </p:sp>
@@ -6461,8 +6377,8 @@
         </p:nvSpPr>
         <p:spPr>
           <a:xfrm>
-            <a:off x="2590800" y="10021824"/>
-            <a:ext cx="8534400" cy="812800"/>
+            <a:off x="891540" y="12047220"/>
+            <a:ext cx="10233660" cy="1120140"/>
           </a:xfrm>
         </p:spPr>
         <p:txBody>
@@ -6490,7 +6406,12 @@
             <p:ph sz="quarter" idx="25"/>
           </p:nvPr>
         </p:nvSpPr>
-        <p:spPr/>
+        <p:spPr>
+          <a:xfrm>
+            <a:off x="857250" y="12992100"/>
+            <a:ext cx="9601200" cy="8293100"/>
+          </a:xfrm>
+        </p:spPr>
         <p:txBody>
           <a:bodyPr/>
           <a:lstStyle/>
@@ -6546,7 +6467,10 @@
           <a:bodyPr/>
           <a:lstStyle/>
           <a:p>
-            <a:endParaRPr lang="en-US" dirty="0"/>
+            <a:r>
+              <a:rPr lang="en-US" dirty="0"/>
+              <a:t>MYERS and miller’s algorithm</a:t>
+            </a:r>
           </a:p>
         </p:txBody>
       </p:sp>
@@ -6560,695 +6484,53 @@
             <p:ph sz="quarter" idx="27"/>
           </p:nvPr>
         </p:nvSpPr>
-        <p:spPr/>
-        <p:txBody>
-          <a:bodyPr/>
-          <a:lstStyle/>
-          <a:p>
-            <a:r>
-              <a:rPr lang="en-US"/>
-              <a:t>List methods and descriptions here</a:t>
-            </a:r>
-          </a:p>
-          <a:p>
-            <a:r>
-              <a:rPr lang="en-US"/>
-              <a:t>Method 1</a:t>
-            </a:r>
-          </a:p>
-          <a:p>
-            <a:r>
-              <a:rPr lang="en-US"/>
-              <a:t>Method 2</a:t>
-            </a:r>
-          </a:p>
-          <a:p>
-            <a:r>
-              <a:rPr lang="en-US"/>
-              <a:t>Method 3</a:t>
-            </a:r>
-            <a:endParaRPr lang="en-US" dirty="0"/>
-          </a:p>
-        </p:txBody>
-      </p:sp>
-      <p:graphicFrame>
-        <p:nvGraphicFramePr>
-          <p:cNvPr id="25" name="Content Placeholder 24" descr="Sample table with 4 columns, 7 rows." title="Sample table"/>
-          <p:cNvGraphicFramePr>
-            <a:graphicFrameLocks noGrp="1"/>
-          </p:cNvGraphicFramePr>
-          <p:nvPr>
-            <p:ph sz="quarter" idx="23"/>
-            <p:extLst>
-              <p:ext uri="{D42A27DB-BD31-4B8C-83A1-F6EECF244321}">
-                <p14:modId xmlns:p14="http://schemas.microsoft.com/office/powerpoint/2010/main" val="2517281170"/>
-              </p:ext>
-            </p:extLst>
-          </p:nvPr>
-        </p:nvGraphicFramePr>
-        <p:xfrm>
-          <a:off x="12192000" y="7965017"/>
-          <a:ext cx="8534400" cy="4023747"/>
-        </p:xfrm>
-        <a:graphic>
-          <a:graphicData uri="http://schemas.openxmlformats.org/drawingml/2006/table">
-            <a:tbl>
-              <a:tblPr firstRow="1" bandRow="1">
-                <a:tableStyleId>{3B4B98B0-60AC-42C2-AFA5-B58CD77FA1E5}</a:tableStyleId>
-              </a:tblPr>
-              <a:tblGrid>
-                <a:gridCol w="2133600">
-                  <a:extLst>
-                    <a:ext uri="{9D8B030D-6E8A-4147-A177-3AD203B41FA5}">
-                      <a16:colId xmlns:a16="http://schemas.microsoft.com/office/drawing/2014/main" val="20000"/>
-                    </a:ext>
-                  </a:extLst>
-                </a:gridCol>
-                <a:gridCol w="2133600">
-                  <a:extLst>
-                    <a:ext uri="{9D8B030D-6E8A-4147-A177-3AD203B41FA5}">
-                      <a16:colId xmlns:a16="http://schemas.microsoft.com/office/drawing/2014/main" val="20001"/>
-                    </a:ext>
-                  </a:extLst>
-                </a:gridCol>
-                <a:gridCol w="2133600">
-                  <a:extLst>
-                    <a:ext uri="{9D8B030D-6E8A-4147-A177-3AD203B41FA5}">
-                      <a16:colId xmlns:a16="http://schemas.microsoft.com/office/drawing/2014/main" val="20002"/>
-                    </a:ext>
-                  </a:extLst>
-                </a:gridCol>
-                <a:gridCol w="2133600">
-                  <a:extLst>
-                    <a:ext uri="{9D8B030D-6E8A-4147-A177-3AD203B41FA5}">
-                      <a16:colId xmlns:a16="http://schemas.microsoft.com/office/drawing/2014/main" val="20003"/>
-                    </a:ext>
-                  </a:extLst>
-                </a:gridCol>
-              </a:tblGrid>
-              <a:tr h="574821">
-                <a:tc>
-                  <a:txBody>
-                    <a:bodyPr/>
-                    <a:lstStyle/>
-                    <a:p>
-                      <a:endParaRPr lang="en-US" sz="1900" dirty="0"/>
-                    </a:p>
-                  </a:txBody>
-                  <a:tcPr marL="60960" marR="60960" marT="30480" marB="30480" anchor="ctr"/>
-                </a:tc>
-                <a:tc>
-                  <a:txBody>
-                    <a:bodyPr/>
-                    <a:lstStyle/>
-                    <a:p>
-                      <a:pPr algn="ctr"/>
-                      <a:r>
-                        <a:rPr lang="en-US" sz="1900" dirty="0"/>
-                        <a:t>Heading</a:t>
-                      </a:r>
-                    </a:p>
-                  </a:txBody>
-                  <a:tcPr marL="60960" marR="60960" marT="30480" marB="30480" anchor="ctr"/>
-                </a:tc>
-                <a:tc>
-                  <a:txBody>
-                    <a:bodyPr/>
-                    <a:lstStyle/>
-                    <a:p>
-                      <a:pPr algn="ctr"/>
-                      <a:r>
-                        <a:rPr lang="en-US" sz="1900" dirty="0"/>
-                        <a:t>Heading</a:t>
-                      </a:r>
-                    </a:p>
-                  </a:txBody>
-                  <a:tcPr marL="60960" marR="60960" marT="30480" marB="30480" anchor="ctr"/>
-                </a:tc>
-                <a:tc>
-                  <a:txBody>
-                    <a:bodyPr/>
-                    <a:lstStyle/>
-                    <a:p>
-                      <a:pPr algn="ctr"/>
-                      <a:r>
-                        <a:rPr lang="en-US" sz="1900" dirty="0"/>
-                        <a:t>Heading</a:t>
-                      </a:r>
-                    </a:p>
-                  </a:txBody>
-                  <a:tcPr marL="60960" marR="60960" marT="30480" marB="30480" anchor="ctr"/>
-                </a:tc>
-                <a:extLst>
-                  <a:ext uri="{0D108BD9-81ED-4DB2-BD59-A6C34878D82A}">
-                    <a16:rowId xmlns:a16="http://schemas.microsoft.com/office/drawing/2014/main" val="10000"/>
-                  </a:ext>
-                </a:extLst>
-              </a:tr>
-              <a:tr h="574821">
-                <a:tc>
-                  <a:txBody>
-                    <a:bodyPr/>
-                    <a:lstStyle/>
-                    <a:p>
-                      <a:r>
-                        <a:rPr lang="en-US" sz="1900" dirty="0"/>
-                        <a:t>Item</a:t>
-                      </a:r>
-                    </a:p>
-                  </a:txBody>
-                  <a:tcPr marL="60960" marR="60960" marT="30480" marB="30480" anchor="ctr"/>
-                </a:tc>
-                <a:tc>
-                  <a:txBody>
-                    <a:bodyPr/>
-                    <a:lstStyle/>
-                    <a:p>
-                      <a:pPr algn="ctr"/>
-                      <a:r>
-                        <a:rPr lang="en-US" sz="1900" dirty="0"/>
-                        <a:t>122</a:t>
-                      </a:r>
-                    </a:p>
-                  </a:txBody>
-                  <a:tcPr marL="60960" marR="60960" marT="30480" marB="30480" anchor="ctr"/>
-                </a:tc>
-                <a:tc>
-                  <a:txBody>
-                    <a:bodyPr/>
-                    <a:lstStyle/>
-                    <a:p>
-                      <a:pPr algn="ctr"/>
-                      <a:r>
-                        <a:rPr lang="en-US" sz="1900" dirty="0"/>
-                        <a:t>233</a:t>
-                      </a:r>
-                    </a:p>
-                  </a:txBody>
-                  <a:tcPr marL="60960" marR="60960" marT="30480" marB="30480" anchor="ctr"/>
-                </a:tc>
-                <a:tc>
-                  <a:txBody>
-                    <a:bodyPr/>
-                    <a:lstStyle/>
-                    <a:p>
-                      <a:pPr algn="ctr"/>
-                      <a:r>
-                        <a:rPr lang="en-US" sz="1900" dirty="0"/>
-                        <a:t>345</a:t>
-                      </a:r>
-                    </a:p>
-                  </a:txBody>
-                  <a:tcPr marL="60960" marR="60960" marT="30480" marB="30480" anchor="ctr"/>
-                </a:tc>
-                <a:extLst>
-                  <a:ext uri="{0D108BD9-81ED-4DB2-BD59-A6C34878D82A}">
-                    <a16:rowId xmlns:a16="http://schemas.microsoft.com/office/drawing/2014/main" val="10001"/>
-                  </a:ext>
-                </a:extLst>
-              </a:tr>
-              <a:tr h="574821">
-                <a:tc>
-                  <a:txBody>
-                    <a:bodyPr/>
-                    <a:lstStyle/>
-                    <a:p>
-                      <a:r>
-                        <a:rPr lang="en-US" sz="1900" dirty="0"/>
-                        <a:t>Item</a:t>
-                      </a:r>
-                    </a:p>
-                  </a:txBody>
-                  <a:tcPr marL="60960" marR="60960" marT="30480" marB="30480" anchor="ctr"/>
-                </a:tc>
-                <a:tc>
-                  <a:txBody>
-                    <a:bodyPr/>
-                    <a:lstStyle/>
-                    <a:p>
-                      <a:pPr algn="ctr"/>
-                      <a:r>
-                        <a:rPr lang="en-US" sz="1900" dirty="0"/>
-                        <a:t>759</a:t>
-                      </a:r>
-                    </a:p>
-                  </a:txBody>
-                  <a:tcPr marL="60960" marR="60960" marT="30480" marB="30480" anchor="ctr"/>
-                </a:tc>
-                <a:tc>
-                  <a:txBody>
-                    <a:bodyPr/>
-                    <a:lstStyle/>
-                    <a:p>
-                      <a:pPr algn="ctr"/>
-                      <a:r>
-                        <a:rPr lang="en-US" sz="1900" dirty="0"/>
-                        <a:t>856</a:t>
-                      </a:r>
-                    </a:p>
-                  </a:txBody>
-                  <a:tcPr marL="60960" marR="60960" marT="30480" marB="30480" anchor="ctr"/>
-                </a:tc>
-                <a:tc>
-                  <a:txBody>
-                    <a:bodyPr/>
-                    <a:lstStyle/>
-                    <a:p>
-                      <a:pPr algn="ctr"/>
-                      <a:r>
-                        <a:rPr lang="en-US" sz="1900" dirty="0"/>
-                        <a:t>290</a:t>
-                      </a:r>
-                    </a:p>
-                  </a:txBody>
-                  <a:tcPr marL="60960" marR="60960" marT="30480" marB="30480" anchor="ctr"/>
-                </a:tc>
-                <a:extLst>
-                  <a:ext uri="{0D108BD9-81ED-4DB2-BD59-A6C34878D82A}">
-                    <a16:rowId xmlns:a16="http://schemas.microsoft.com/office/drawing/2014/main" val="10002"/>
-                  </a:ext>
-                </a:extLst>
-              </a:tr>
-              <a:tr h="574821">
-                <a:tc>
-                  <a:txBody>
-                    <a:bodyPr/>
-                    <a:lstStyle/>
-                    <a:p>
-                      <a:r>
-                        <a:rPr lang="en-US" sz="1900" dirty="0"/>
-                        <a:t>Item</a:t>
-                      </a:r>
-                    </a:p>
-                  </a:txBody>
-                  <a:tcPr marL="60960" marR="60960" marT="30480" marB="30480" anchor="ctr"/>
-                </a:tc>
-                <a:tc>
-                  <a:txBody>
-                    <a:bodyPr/>
-                    <a:lstStyle/>
-                    <a:p>
-                      <a:pPr algn="ctr"/>
-                      <a:r>
-                        <a:rPr lang="en-US" sz="1900" dirty="0"/>
-                        <a:t>228</a:t>
-                      </a:r>
-                    </a:p>
-                  </a:txBody>
-                  <a:tcPr marL="60960" marR="60960" marT="30480" marB="30480" anchor="ctr"/>
-                </a:tc>
-                <a:tc>
-                  <a:txBody>
-                    <a:bodyPr/>
-                    <a:lstStyle/>
-                    <a:p>
-                      <a:pPr algn="ctr"/>
-                      <a:r>
-                        <a:rPr lang="en-US" sz="1900" dirty="0"/>
-                        <a:t>134</a:t>
-                      </a:r>
-                    </a:p>
-                  </a:txBody>
-                  <a:tcPr marL="60960" marR="60960" marT="30480" marB="30480" anchor="ctr"/>
-                </a:tc>
-                <a:tc>
-                  <a:txBody>
-                    <a:bodyPr/>
-                    <a:lstStyle/>
-                    <a:p>
-                      <a:pPr algn="ctr"/>
-                      <a:r>
-                        <a:rPr lang="en-US" sz="1900" dirty="0"/>
-                        <a:t>238</a:t>
-                      </a:r>
-                    </a:p>
-                  </a:txBody>
-                  <a:tcPr marL="60960" marR="60960" marT="30480" marB="30480" anchor="ctr"/>
-                </a:tc>
-                <a:extLst>
-                  <a:ext uri="{0D108BD9-81ED-4DB2-BD59-A6C34878D82A}">
-                    <a16:rowId xmlns:a16="http://schemas.microsoft.com/office/drawing/2014/main" val="10003"/>
-                  </a:ext>
-                </a:extLst>
-              </a:tr>
-              <a:tr h="574821">
-                <a:tc>
-                  <a:txBody>
-                    <a:bodyPr/>
-                    <a:lstStyle/>
-                    <a:p>
-                      <a:r>
-                        <a:rPr lang="en-US" sz="1900" dirty="0"/>
-                        <a:t>Item</a:t>
-                      </a:r>
-                    </a:p>
-                  </a:txBody>
-                  <a:tcPr marL="60960" marR="60960" marT="30480" marB="30480" anchor="ctr"/>
-                </a:tc>
-                <a:tc>
-                  <a:txBody>
-                    <a:bodyPr/>
-                    <a:lstStyle/>
-                    <a:p>
-                      <a:pPr algn="ctr"/>
-                      <a:r>
-                        <a:rPr lang="en-US" sz="1900" dirty="0"/>
-                        <a:t>954</a:t>
-                      </a:r>
-                    </a:p>
-                  </a:txBody>
-                  <a:tcPr marL="60960" marR="60960" marT="30480" marB="30480" anchor="ctr"/>
-                </a:tc>
-                <a:tc>
-                  <a:txBody>
-                    <a:bodyPr/>
-                    <a:lstStyle/>
-                    <a:p>
-                      <a:pPr algn="ctr"/>
-                      <a:r>
-                        <a:rPr lang="en-US" sz="1900" dirty="0"/>
-                        <a:t>875</a:t>
-                      </a:r>
-                    </a:p>
-                  </a:txBody>
-                  <a:tcPr marL="60960" marR="60960" marT="30480" marB="30480" anchor="ctr"/>
-                </a:tc>
-                <a:tc>
-                  <a:txBody>
-                    <a:bodyPr/>
-                    <a:lstStyle/>
-                    <a:p>
-                      <a:pPr algn="ctr"/>
-                      <a:r>
-                        <a:rPr lang="en-US" sz="1900" dirty="0"/>
-                        <a:t>976</a:t>
-                      </a:r>
-                    </a:p>
-                  </a:txBody>
-                  <a:tcPr marL="60960" marR="60960" marT="30480" marB="30480" anchor="ctr"/>
-                </a:tc>
-                <a:extLst>
-                  <a:ext uri="{0D108BD9-81ED-4DB2-BD59-A6C34878D82A}">
-                    <a16:rowId xmlns:a16="http://schemas.microsoft.com/office/drawing/2014/main" val="10004"/>
-                  </a:ext>
-                </a:extLst>
-              </a:tr>
-              <a:tr h="574821">
-                <a:tc>
-                  <a:txBody>
-                    <a:bodyPr/>
-                    <a:lstStyle/>
-                    <a:p>
-                      <a:r>
-                        <a:rPr lang="en-US" sz="1900" dirty="0"/>
-                        <a:t>Item</a:t>
-                      </a:r>
-                    </a:p>
-                  </a:txBody>
-                  <a:tcPr marL="60960" marR="60960" marT="30480" marB="30480" anchor="ctr"/>
-                </a:tc>
-                <a:tc>
-                  <a:txBody>
-                    <a:bodyPr/>
-                    <a:lstStyle/>
-                    <a:p>
-                      <a:pPr algn="ctr"/>
-                      <a:r>
-                        <a:rPr lang="en-US" sz="1900" dirty="0"/>
-                        <a:t>324</a:t>
-                      </a:r>
-                    </a:p>
-                  </a:txBody>
-                  <a:tcPr marL="60960" marR="60960" marT="30480" marB="30480" anchor="ctr"/>
-                </a:tc>
-                <a:tc>
-                  <a:txBody>
-                    <a:bodyPr/>
-                    <a:lstStyle/>
-                    <a:p>
-                      <a:pPr algn="ctr"/>
-                      <a:r>
-                        <a:rPr lang="en-US" sz="1900" dirty="0"/>
-                        <a:t>325</a:t>
-                      </a:r>
-                    </a:p>
-                  </a:txBody>
-                  <a:tcPr marL="60960" marR="60960" marT="30480" marB="30480" anchor="ctr"/>
-                </a:tc>
-                <a:tc>
-                  <a:txBody>
-                    <a:bodyPr/>
-                    <a:lstStyle/>
-                    <a:p>
-                      <a:pPr algn="ctr"/>
-                      <a:r>
-                        <a:rPr lang="en-US" sz="1900" dirty="0"/>
-                        <a:t>301</a:t>
-                      </a:r>
-                    </a:p>
-                  </a:txBody>
-                  <a:tcPr marL="60960" marR="60960" marT="30480" marB="30480" anchor="ctr"/>
-                </a:tc>
-                <a:extLst>
-                  <a:ext uri="{0D108BD9-81ED-4DB2-BD59-A6C34878D82A}">
-                    <a16:rowId xmlns:a16="http://schemas.microsoft.com/office/drawing/2014/main" val="10005"/>
-                  </a:ext>
-                </a:extLst>
-              </a:tr>
-              <a:tr h="574821">
-                <a:tc>
-                  <a:txBody>
-                    <a:bodyPr/>
-                    <a:lstStyle/>
-                    <a:p>
-                      <a:r>
-                        <a:rPr lang="en-US" sz="1900" dirty="0"/>
-                        <a:t>Item</a:t>
-                      </a:r>
-                    </a:p>
-                  </a:txBody>
-                  <a:tcPr marL="60960" marR="60960" marT="30480" marB="30480" anchor="ctr"/>
-                </a:tc>
-                <a:tc>
-                  <a:txBody>
-                    <a:bodyPr/>
-                    <a:lstStyle/>
-                    <a:p>
-                      <a:pPr algn="ctr"/>
-                      <a:r>
-                        <a:rPr lang="en-US" sz="1900" dirty="0"/>
-                        <a:t>199</a:t>
-                      </a:r>
-                    </a:p>
-                  </a:txBody>
-                  <a:tcPr marL="60960" marR="60960" marT="30480" marB="30480" anchor="ctr"/>
-                </a:tc>
-                <a:tc>
-                  <a:txBody>
-                    <a:bodyPr/>
-                    <a:lstStyle/>
-                    <a:p>
-                      <a:pPr algn="ctr"/>
-                      <a:r>
-                        <a:rPr lang="en-US" sz="1900" dirty="0"/>
-                        <a:t>137</a:t>
-                      </a:r>
-                    </a:p>
-                  </a:txBody>
-                  <a:tcPr marL="60960" marR="60960" marT="30480" marB="30480" anchor="ctr"/>
-                </a:tc>
-                <a:tc>
-                  <a:txBody>
-                    <a:bodyPr/>
-                    <a:lstStyle/>
-                    <a:p>
-                      <a:pPr algn="ctr"/>
-                      <a:r>
-                        <a:rPr lang="en-US" sz="1900" dirty="0"/>
-                        <a:t>186</a:t>
-                      </a:r>
-                    </a:p>
-                  </a:txBody>
-                  <a:tcPr marL="60960" marR="60960" marT="30480" marB="30480" anchor="ctr"/>
-                </a:tc>
-                <a:extLst>
-                  <a:ext uri="{0D108BD9-81ED-4DB2-BD59-A6C34878D82A}">
-                    <a16:rowId xmlns:a16="http://schemas.microsoft.com/office/drawing/2014/main" val="10006"/>
-                  </a:ext>
-                </a:extLst>
-              </a:tr>
-            </a:tbl>
-          </a:graphicData>
-        </a:graphic>
-      </p:graphicFrame>
-      <p:pic>
-        <p:nvPicPr>
-          <p:cNvPr id="27" name="Picture 26" descr="Xray of spine" title="Sample Picture"/>
-          <p:cNvPicPr>
-            <a:picLocks noChangeAspect="1"/>
-          </p:cNvPicPr>
-          <p:nvPr/>
-        </p:nvPicPr>
-        <p:blipFill>
-          <a:blip r:embed="rId4" cstate="print">
-            <a:extLst>
-              <a:ext uri="{28A0092B-C50C-407E-A947-70E740481C1C}">
-                <a14:useLocalDpi xmlns:a14="http://schemas.microsoft.com/office/drawing/2010/main" val="0"/>
-              </a:ext>
-            </a:extLst>
-          </a:blip>
-          <a:stretch>
-            <a:fillRect/>
-          </a:stretch>
-        </p:blipFill>
         <p:spPr>
           <a:xfrm>
-            <a:off x="12192000" y="12598400"/>
-            <a:ext cx="1889761" cy="2645664"/>
+            <a:off x="11658600" y="4714240"/>
+            <a:ext cx="9601200" cy="16570960"/>
           </a:xfrm>
-          <a:prstGeom prst="rect">
-            <a:avLst/>
-          </a:prstGeom>
         </p:spPr>
-      </p:pic>
-      <p:pic>
-        <p:nvPicPr>
-          <p:cNvPr id="29" name="Picture 28" descr="Xray of hand" title="Sample Picture"/>
-          <p:cNvPicPr>
-            <a:picLocks noChangeAspect="1"/>
-          </p:cNvPicPr>
-          <p:nvPr/>
-        </p:nvPicPr>
-        <p:blipFill>
-          <a:blip r:embed="rId5">
-            <a:extLst>
-              <a:ext uri="{28A0092B-C50C-407E-A947-70E740481C1C}">
-                <a14:useLocalDpi xmlns:a14="http://schemas.microsoft.com/office/drawing/2010/main" val="0"/>
-              </a:ext>
-            </a:extLst>
-          </a:blip>
-          <a:stretch>
-            <a:fillRect/>
-          </a:stretch>
-        </p:blipFill>
-        <p:spPr>
-          <a:xfrm>
-            <a:off x="14352100" y="12598400"/>
-            <a:ext cx="2403145" cy="2645664"/>
-          </a:xfrm>
-          <a:prstGeom prst="rect">
-            <a:avLst/>
-          </a:prstGeom>
-        </p:spPr>
-      </p:pic>
-      <p:pic>
-        <p:nvPicPr>
-          <p:cNvPr id="28" name="Picture 27" descr="Xray of head" title="Sample Picture"/>
-          <p:cNvPicPr>
-            <a:picLocks noChangeAspect="1"/>
-          </p:cNvPicPr>
-          <p:nvPr/>
-        </p:nvPicPr>
-        <p:blipFill>
-          <a:blip r:embed="rId6" cstate="print">
-            <a:extLst>
-              <a:ext uri="{28A0092B-C50C-407E-A947-70E740481C1C}">
-                <a14:useLocalDpi xmlns:a14="http://schemas.microsoft.com/office/drawing/2010/main" val="0"/>
-              </a:ext>
-            </a:extLst>
-          </a:blip>
-          <a:stretch>
-            <a:fillRect/>
-          </a:stretch>
-        </p:blipFill>
-        <p:spPr>
-          <a:xfrm>
-            <a:off x="17025583" y="12598400"/>
-            <a:ext cx="3703929" cy="2645664"/>
-          </a:xfrm>
-          <a:prstGeom prst="rect">
-            <a:avLst/>
-          </a:prstGeom>
-        </p:spPr>
-      </p:pic>
-      <p:sp>
-        <p:nvSpPr>
-          <p:cNvPr id="15" name="Content Placeholder 14"/>
-          <p:cNvSpPr>
-            <a:spLocks noGrp="1"/>
-          </p:cNvSpPr>
-          <p:nvPr>
-            <p:ph sz="quarter" idx="28"/>
-          </p:nvPr>
-        </p:nvSpPr>
-        <p:spPr/>
         <p:txBody>
-          <a:bodyPr/>
+          <a:bodyPr>
+            <a:normAutofit/>
+          </a:bodyPr>
           <a:lstStyle/>
           <a:p>
             <a:r>
-              <a:rPr lang="en-US"/>
-              <a:t>Type a caption for the data content or pictures here.</a:t>
-            </a:r>
-            <a:endParaRPr lang="en-US" dirty="0"/>
-          </a:p>
-        </p:txBody>
-      </p:sp>
-      <p:sp>
-        <p:nvSpPr>
-          <p:cNvPr id="16" name="Text Placeholder 15"/>
-          <p:cNvSpPr>
-            <a:spLocks noGrp="1"/>
-          </p:cNvSpPr>
-          <p:nvPr>
-            <p:ph type="body" sz="quarter" idx="29"/>
-          </p:nvPr>
-        </p:nvSpPr>
-        <p:spPr/>
-        <p:txBody>
-          <a:bodyPr/>
-          <a:lstStyle/>
-          <a:p>
-            <a:r>
-              <a:rPr lang="en-US"/>
-              <a:t>results</a:t>
-            </a:r>
-            <a:endParaRPr lang="en-US" dirty="0"/>
-          </a:p>
-        </p:txBody>
-      </p:sp>
-      <p:sp>
-        <p:nvSpPr>
-          <p:cNvPr id="17" name="Content Placeholder 16"/>
-          <p:cNvSpPr>
-            <a:spLocks noGrp="1"/>
-          </p:cNvSpPr>
-          <p:nvPr>
-            <p:ph sz="quarter" idx="30"/>
-          </p:nvPr>
-        </p:nvSpPr>
-        <p:spPr/>
-        <p:txBody>
-          <a:bodyPr/>
-          <a:lstStyle/>
-          <a:p>
-            <a:r>
-              <a:rPr lang="en-US"/>
-              <a:t>Result 1</a:t>
-            </a:r>
-          </a:p>
-          <a:p>
-            <a:r>
-              <a:rPr lang="en-US"/>
-              <a:t>Result 2</a:t>
-            </a:r>
-          </a:p>
-          <a:p>
-            <a:r>
-              <a:rPr lang="en-US"/>
-              <a:t>Result 3</a:t>
-            </a:r>
-            <a:endParaRPr lang="en-US" dirty="0"/>
+              <a:rPr lang="en-US" sz="2400" b="1" dirty="0"/>
+              <a:t>INPUT:</a:t>
+            </a:r>
+            <a:r>
+              <a:rPr lang="en-US" sz="2400" dirty="0"/>
+              <a:t>  A string (s) and error value (k)</a:t>
+            </a:r>
+          </a:p>
+          <a:p>
+            <a:r>
+              <a:rPr lang="en-US" sz="2400" b="1" dirty="0"/>
+              <a:t>OUTPUT:</a:t>
+            </a:r>
+            <a:r>
+              <a:rPr lang="en-US" sz="2400" dirty="0"/>
+              <a:t> True, if the string satisfies the regular expression after at most k errors</a:t>
+            </a:r>
+          </a:p>
+          <a:p>
+            <a:r>
+              <a:rPr lang="en-US" sz="2400" b="1" dirty="0"/>
+              <a:t>METHOD:</a:t>
+            </a:r>
+          </a:p>
+          <a:p>
+            <a:pPr lvl="1"/>
+            <a:r>
+              <a:rPr lang="en-US" sz="2133" dirty="0"/>
+              <a:t>Construct an NFA using Thompson’s algorithm and of size length(s)</a:t>
+            </a:r>
+          </a:p>
+          <a:p>
+            <a:pPr lvl="1"/>
+            <a:endParaRPr lang="en-US" sz="2133" dirty="0"/>
           </a:p>
         </p:txBody>
       </p:sp>
@@ -7296,7 +6578,7 @@
         </p:xfrm>
         <a:graphic>
           <a:graphicData uri="http://schemas.openxmlformats.org/drawingml/2006/chart">
-            <c:chart xmlns:c="http://schemas.openxmlformats.org/drawingml/2006/chart" xmlns:r="http://schemas.openxmlformats.org/officeDocument/2006/relationships" r:id="rId7"/>
+            <c:chart xmlns:c="http://schemas.openxmlformats.org/drawingml/2006/chart" xmlns:r="http://schemas.openxmlformats.org/officeDocument/2006/relationships" r:id="rId3"/>
           </a:graphicData>
         </a:graphic>
       </p:graphicFrame>
@@ -7321,7 +6603,7 @@
         </p:xfrm>
         <a:graphic>
           <a:graphicData uri="http://schemas.openxmlformats.org/drawingml/2006/chart">
-            <c:chart xmlns:c="http://schemas.openxmlformats.org/drawingml/2006/chart" xmlns:r="http://schemas.openxmlformats.org/officeDocument/2006/relationships" r:id="rId8"/>
+            <c:chart xmlns:c="http://schemas.openxmlformats.org/drawingml/2006/chart" xmlns:r="http://schemas.openxmlformats.org/officeDocument/2006/relationships" r:id="rId4"/>
           </a:graphicData>
         </a:graphic>
       </p:graphicFrame>
@@ -7398,15 +6680,105 @@
           <p:nvPr/>
         </p:nvPicPr>
         <p:blipFill>
-          <a:blip r:embed="rId9"/>
+          <a:blip r:embed="rId5"/>
           <a:stretch>
             <a:fillRect/>
           </a:stretch>
         </p:blipFill>
         <p:spPr>
           <a:xfrm>
-            <a:off x="3991898" y="12758208"/>
+            <a:off x="891540" y="15027287"/>
             <a:ext cx="6126569" cy="6058777"/>
+          </a:xfrm>
+          <a:prstGeom prst="rect">
+            <a:avLst/>
+          </a:prstGeom>
+        </p:spPr>
+      </p:pic>
+      <p:pic>
+        <p:nvPicPr>
+          <p:cNvPr id="10" name="Picture 9">
+            <a:extLst>
+              <a:ext uri="{FF2B5EF4-FFF2-40B4-BE49-F238E27FC236}">
+                <a16:creationId xmlns:a16="http://schemas.microsoft.com/office/drawing/2014/main" id="{1E7659B8-9EA3-456B-B592-D423CD221219}"/>
+              </a:ext>
+            </a:extLst>
+          </p:cNvPr>
+          <p:cNvPicPr>
+            <a:picLocks noChangeAspect="1"/>
+          </p:cNvPicPr>
+          <p:nvPr/>
+        </p:nvPicPr>
+        <p:blipFill>
+          <a:blip r:embed="rId6"/>
+          <a:stretch>
+            <a:fillRect/>
+          </a:stretch>
+        </p:blipFill>
+        <p:spPr>
+          <a:xfrm>
+            <a:off x="14752955" y="7117080"/>
+            <a:ext cx="2931178" cy="2743200"/>
+          </a:xfrm>
+          <a:prstGeom prst="rect">
+            <a:avLst/>
+          </a:prstGeom>
+        </p:spPr>
+      </p:pic>
+      <p:pic>
+        <p:nvPicPr>
+          <p:cNvPr id="34" name="Picture 33">
+            <a:extLst>
+              <a:ext uri="{FF2B5EF4-FFF2-40B4-BE49-F238E27FC236}">
+                <a16:creationId xmlns:a16="http://schemas.microsoft.com/office/drawing/2014/main" id="{3FEA9EEB-0CE9-4975-9F1A-51165F01F2BA}"/>
+              </a:ext>
+            </a:extLst>
+          </p:cNvPr>
+          <p:cNvPicPr>
+            <a:picLocks noChangeAspect="1"/>
+          </p:cNvPicPr>
+          <p:nvPr/>
+        </p:nvPicPr>
+        <p:blipFill>
+          <a:blip r:embed="rId7"/>
+          <a:stretch>
+            <a:fillRect/>
+          </a:stretch>
+        </p:blipFill>
+        <p:spPr>
+          <a:xfrm>
+            <a:off x="898677" y="337376"/>
+            <a:ext cx="5109693" cy="2743200"/>
+          </a:xfrm>
+          <a:prstGeom prst="rect">
+            <a:avLst/>
+          </a:prstGeom>
+        </p:spPr>
+      </p:pic>
+      <p:pic>
+        <p:nvPicPr>
+          <p:cNvPr id="37" name="Picture 36">
+            <a:extLst>
+              <a:ext uri="{FF2B5EF4-FFF2-40B4-BE49-F238E27FC236}">
+                <a16:creationId xmlns:a16="http://schemas.microsoft.com/office/drawing/2014/main" id="{EDE8F3F9-6245-4493-9BE6-60260F1F5038}"/>
+              </a:ext>
+            </a:extLst>
+          </p:cNvPr>
+          <p:cNvPicPr>
+            <a:picLocks noChangeAspect="1"/>
+          </p:cNvPicPr>
+          <p:nvPr/>
+        </p:nvPicPr>
+        <p:blipFill>
+          <a:blip r:embed="rId8"/>
+          <a:stretch>
+            <a:fillRect/>
+          </a:stretch>
+        </p:blipFill>
+        <p:spPr>
+          <a:xfrm>
+            <a:off x="27226260" y="317984"/>
+            <a:ext cx="2984446" cy="2743200"/>
           </a:xfrm>
           <a:prstGeom prst="rect">
             <a:avLst/>

</xml_diff>